<commit_message>
cdc data channel done.
</commit_message>
<xml_diff>
--- a/usb/document/USB stack design.pptx
+++ b/usb/document/USB stack design.pptx
@@ -7,7 +7,8 @@
   <p:sldIdLst>
     <p:sldId id="256" r:id="rId2"/>
     <p:sldId id="257" r:id="rId3"/>
-    <p:sldId id="258" r:id="rId4"/>
+    <p:sldId id="259" r:id="rId4"/>
+    <p:sldId id="258" r:id="rId5"/>
   </p:sldIdLst>
   <p:sldSz cx="12192000" cy="6858000"/>
   <p:notesSz cx="6858000" cy="9144000"/>
@@ -265,9 +266,9 @@
           <a:p>
             <a:fld id="{C2E193D0-60A0-4C30-B7B8-9875B086E2F0}" type="datetimeFigureOut">
               <a:rPr lang="en-US" smtClean="0"/>
-              <a:t>2/4/2018</a:t>
+              <a:t>2/8/2018</a:t>
             </a:fld>
-            <a:endParaRPr lang="en-US"/>
+            <a:endParaRPr lang="en-US" dirty="0"/>
           </a:p>
         </p:txBody>
       </p:sp>
@@ -292,7 +293,7 @@
           <a:bodyPr/>
           <a:lstStyle/>
           <a:p>
-            <a:endParaRPr lang="en-US"/>
+            <a:endParaRPr lang="en-US" dirty="0"/>
           </a:p>
         </p:txBody>
       </p:sp>
@@ -321,7 +322,7 @@
               <a:rPr lang="en-US" smtClean="0"/>
               <a:t>‹#›</a:t>
             </a:fld>
-            <a:endParaRPr lang="en-US"/>
+            <a:endParaRPr lang="en-US" dirty="0"/>
           </a:p>
         </p:txBody>
       </p:sp>
@@ -463,9 +464,9 @@
           <a:p>
             <a:fld id="{C2E193D0-60A0-4C30-B7B8-9875B086E2F0}" type="datetimeFigureOut">
               <a:rPr lang="en-US" smtClean="0"/>
-              <a:t>2/4/2018</a:t>
+              <a:t>2/8/2018</a:t>
             </a:fld>
-            <a:endParaRPr lang="en-US"/>
+            <a:endParaRPr lang="en-US" dirty="0"/>
           </a:p>
         </p:txBody>
       </p:sp>
@@ -490,7 +491,7 @@
           <a:bodyPr/>
           <a:lstStyle/>
           <a:p>
-            <a:endParaRPr lang="en-US"/>
+            <a:endParaRPr lang="en-US" dirty="0"/>
           </a:p>
         </p:txBody>
       </p:sp>
@@ -519,7 +520,7 @@
               <a:rPr lang="en-US" smtClean="0"/>
               <a:t>‹#›</a:t>
             </a:fld>
-            <a:endParaRPr lang="en-US"/>
+            <a:endParaRPr lang="en-US" dirty="0"/>
           </a:p>
         </p:txBody>
       </p:sp>
@@ -671,9 +672,9 @@
           <a:p>
             <a:fld id="{C2E193D0-60A0-4C30-B7B8-9875B086E2F0}" type="datetimeFigureOut">
               <a:rPr lang="en-US" smtClean="0"/>
-              <a:t>2/4/2018</a:t>
+              <a:t>2/8/2018</a:t>
             </a:fld>
-            <a:endParaRPr lang="en-US"/>
+            <a:endParaRPr lang="en-US" dirty="0"/>
           </a:p>
         </p:txBody>
       </p:sp>
@@ -698,7 +699,7 @@
           <a:bodyPr/>
           <a:lstStyle/>
           <a:p>
-            <a:endParaRPr lang="en-US"/>
+            <a:endParaRPr lang="en-US" dirty="0"/>
           </a:p>
         </p:txBody>
       </p:sp>
@@ -727,7 +728,7 @@
               <a:rPr lang="en-US" smtClean="0"/>
               <a:t>‹#›</a:t>
             </a:fld>
-            <a:endParaRPr lang="en-US"/>
+            <a:endParaRPr lang="en-US" dirty="0"/>
           </a:p>
         </p:txBody>
       </p:sp>
@@ -869,9 +870,9 @@
           <a:p>
             <a:fld id="{C2E193D0-60A0-4C30-B7B8-9875B086E2F0}" type="datetimeFigureOut">
               <a:rPr lang="en-US" smtClean="0"/>
-              <a:t>2/4/2018</a:t>
+              <a:t>2/8/2018</a:t>
             </a:fld>
-            <a:endParaRPr lang="en-US"/>
+            <a:endParaRPr lang="en-US" dirty="0"/>
           </a:p>
         </p:txBody>
       </p:sp>
@@ -896,7 +897,7 @@
           <a:bodyPr/>
           <a:lstStyle/>
           <a:p>
-            <a:endParaRPr lang="en-US"/>
+            <a:endParaRPr lang="en-US" dirty="0"/>
           </a:p>
         </p:txBody>
       </p:sp>
@@ -925,7 +926,7 @@
               <a:rPr lang="en-US" smtClean="0"/>
               <a:t>‹#›</a:t>
             </a:fld>
-            <a:endParaRPr lang="en-US"/>
+            <a:endParaRPr lang="en-US" dirty="0"/>
           </a:p>
         </p:txBody>
       </p:sp>
@@ -1144,9 +1145,9 @@
           <a:p>
             <a:fld id="{C2E193D0-60A0-4C30-B7B8-9875B086E2F0}" type="datetimeFigureOut">
               <a:rPr lang="en-US" smtClean="0"/>
-              <a:t>2/4/2018</a:t>
+              <a:t>2/8/2018</a:t>
             </a:fld>
-            <a:endParaRPr lang="en-US"/>
+            <a:endParaRPr lang="en-US" dirty="0"/>
           </a:p>
         </p:txBody>
       </p:sp>
@@ -1171,7 +1172,7 @@
           <a:bodyPr/>
           <a:lstStyle/>
           <a:p>
-            <a:endParaRPr lang="en-US"/>
+            <a:endParaRPr lang="en-US" dirty="0"/>
           </a:p>
         </p:txBody>
       </p:sp>
@@ -1200,7 +1201,7 @@
               <a:rPr lang="en-US" smtClean="0"/>
               <a:t>‹#›</a:t>
             </a:fld>
-            <a:endParaRPr lang="en-US"/>
+            <a:endParaRPr lang="en-US" dirty="0"/>
           </a:p>
         </p:txBody>
       </p:sp>
@@ -1409,9 +1410,9 @@
           <a:p>
             <a:fld id="{C2E193D0-60A0-4C30-B7B8-9875B086E2F0}" type="datetimeFigureOut">
               <a:rPr lang="en-US" smtClean="0"/>
-              <a:t>2/4/2018</a:t>
+              <a:t>2/8/2018</a:t>
             </a:fld>
-            <a:endParaRPr lang="en-US"/>
+            <a:endParaRPr lang="en-US" dirty="0"/>
           </a:p>
         </p:txBody>
       </p:sp>
@@ -1436,7 +1437,7 @@
           <a:bodyPr/>
           <a:lstStyle/>
           <a:p>
-            <a:endParaRPr lang="en-US"/>
+            <a:endParaRPr lang="en-US" dirty="0"/>
           </a:p>
         </p:txBody>
       </p:sp>
@@ -1465,7 +1466,7 @@
               <a:rPr lang="en-US" smtClean="0"/>
               <a:t>‹#›</a:t>
             </a:fld>
-            <a:endParaRPr lang="en-US"/>
+            <a:endParaRPr lang="en-US" dirty="0"/>
           </a:p>
         </p:txBody>
       </p:sp>
@@ -1821,9 +1822,9 @@
           <a:p>
             <a:fld id="{C2E193D0-60A0-4C30-B7B8-9875B086E2F0}" type="datetimeFigureOut">
               <a:rPr lang="en-US" smtClean="0"/>
-              <a:t>2/4/2018</a:t>
+              <a:t>2/8/2018</a:t>
             </a:fld>
-            <a:endParaRPr lang="en-US"/>
+            <a:endParaRPr lang="en-US" dirty="0"/>
           </a:p>
         </p:txBody>
       </p:sp>
@@ -1848,7 +1849,7 @@
           <a:bodyPr/>
           <a:lstStyle/>
           <a:p>
-            <a:endParaRPr lang="en-US"/>
+            <a:endParaRPr lang="en-US" dirty="0"/>
           </a:p>
         </p:txBody>
       </p:sp>
@@ -1877,7 +1878,7 @@
               <a:rPr lang="en-US" smtClean="0"/>
               <a:t>‹#›</a:t>
             </a:fld>
-            <a:endParaRPr lang="en-US"/>
+            <a:endParaRPr lang="en-US" dirty="0"/>
           </a:p>
         </p:txBody>
       </p:sp>
@@ -1962,9 +1963,9 @@
           <a:p>
             <a:fld id="{C2E193D0-60A0-4C30-B7B8-9875B086E2F0}" type="datetimeFigureOut">
               <a:rPr lang="en-US" smtClean="0"/>
-              <a:t>2/4/2018</a:t>
+              <a:t>2/8/2018</a:t>
             </a:fld>
-            <a:endParaRPr lang="en-US"/>
+            <a:endParaRPr lang="en-US" dirty="0"/>
           </a:p>
         </p:txBody>
       </p:sp>
@@ -1989,7 +1990,7 @@
           <a:bodyPr/>
           <a:lstStyle/>
           <a:p>
-            <a:endParaRPr lang="en-US"/>
+            <a:endParaRPr lang="en-US" dirty="0"/>
           </a:p>
         </p:txBody>
       </p:sp>
@@ -2018,7 +2019,7 @@
               <a:rPr lang="en-US" smtClean="0"/>
               <a:t>‹#›</a:t>
             </a:fld>
-            <a:endParaRPr lang="en-US"/>
+            <a:endParaRPr lang="en-US" dirty="0"/>
           </a:p>
         </p:txBody>
       </p:sp>
@@ -2075,9 +2076,9 @@
           <a:p>
             <a:fld id="{C2E193D0-60A0-4C30-B7B8-9875B086E2F0}" type="datetimeFigureOut">
               <a:rPr lang="en-US" smtClean="0"/>
-              <a:t>2/4/2018</a:t>
+              <a:t>2/8/2018</a:t>
             </a:fld>
-            <a:endParaRPr lang="en-US"/>
+            <a:endParaRPr lang="en-US" dirty="0"/>
           </a:p>
         </p:txBody>
       </p:sp>
@@ -2102,7 +2103,7 @@
           <a:bodyPr/>
           <a:lstStyle/>
           <a:p>
-            <a:endParaRPr lang="en-US"/>
+            <a:endParaRPr lang="en-US" dirty="0"/>
           </a:p>
         </p:txBody>
       </p:sp>
@@ -2131,7 +2132,7 @@
               <a:rPr lang="en-US" smtClean="0"/>
               <a:t>‹#›</a:t>
             </a:fld>
-            <a:endParaRPr lang="en-US"/>
+            <a:endParaRPr lang="en-US" dirty="0"/>
           </a:p>
         </p:txBody>
       </p:sp>
@@ -2386,9 +2387,9 @@
           <a:p>
             <a:fld id="{C2E193D0-60A0-4C30-B7B8-9875B086E2F0}" type="datetimeFigureOut">
               <a:rPr lang="en-US" smtClean="0"/>
-              <a:t>2/4/2018</a:t>
+              <a:t>2/8/2018</a:t>
             </a:fld>
-            <a:endParaRPr lang="en-US"/>
+            <a:endParaRPr lang="en-US" dirty="0"/>
           </a:p>
         </p:txBody>
       </p:sp>
@@ -2413,7 +2414,7 @@
           <a:bodyPr/>
           <a:lstStyle/>
           <a:p>
-            <a:endParaRPr lang="en-US"/>
+            <a:endParaRPr lang="en-US" dirty="0"/>
           </a:p>
         </p:txBody>
       </p:sp>
@@ -2442,7 +2443,7 @@
               <a:rPr lang="en-US" smtClean="0"/>
               <a:t>‹#›</a:t>
             </a:fld>
-            <a:endParaRPr lang="en-US"/>
+            <a:endParaRPr lang="en-US" dirty="0"/>
           </a:p>
         </p:txBody>
       </p:sp>
@@ -2576,7 +2577,7 @@
             </a:lvl9pPr>
           </a:lstStyle>
           <a:p>
-            <a:endParaRPr lang="en-US"/>
+            <a:endParaRPr lang="en-US" dirty="0"/>
           </a:p>
         </p:txBody>
       </p:sp>
@@ -2674,9 +2675,9 @@
           <a:p>
             <a:fld id="{C2E193D0-60A0-4C30-B7B8-9875B086E2F0}" type="datetimeFigureOut">
               <a:rPr lang="en-US" smtClean="0"/>
-              <a:t>2/4/2018</a:t>
+              <a:t>2/8/2018</a:t>
             </a:fld>
-            <a:endParaRPr lang="en-US"/>
+            <a:endParaRPr lang="en-US" dirty="0"/>
           </a:p>
         </p:txBody>
       </p:sp>
@@ -2701,7 +2702,7 @@
           <a:bodyPr/>
           <a:lstStyle/>
           <a:p>
-            <a:endParaRPr lang="en-US"/>
+            <a:endParaRPr lang="en-US" dirty="0"/>
           </a:p>
         </p:txBody>
       </p:sp>
@@ -2730,7 +2731,7 @@
               <a:rPr lang="en-US" smtClean="0"/>
               <a:t>‹#›</a:t>
             </a:fld>
-            <a:endParaRPr lang="en-US"/>
+            <a:endParaRPr lang="en-US" dirty="0"/>
           </a:p>
         </p:txBody>
       </p:sp>
@@ -2915,9 +2916,9 @@
           <a:p>
             <a:fld id="{C2E193D0-60A0-4C30-B7B8-9875B086E2F0}" type="datetimeFigureOut">
               <a:rPr lang="en-US" smtClean="0"/>
-              <a:t>2/4/2018</a:t>
+              <a:t>2/8/2018</a:t>
             </a:fld>
-            <a:endParaRPr lang="en-US"/>
+            <a:endParaRPr lang="en-US" dirty="0"/>
           </a:p>
         </p:txBody>
       </p:sp>
@@ -2960,7 +2961,7 @@
             </a:lvl1pPr>
           </a:lstStyle>
           <a:p>
-            <a:endParaRPr lang="en-US"/>
+            <a:endParaRPr lang="en-US" dirty="0"/>
           </a:p>
         </p:txBody>
       </p:sp>
@@ -3007,7 +3008,7 @@
               <a:rPr lang="en-US" smtClean="0"/>
               <a:t>‹#›</a:t>
             </a:fld>
-            <a:endParaRPr lang="en-US"/>
+            <a:endParaRPr lang="en-US" dirty="0"/>
           </a:p>
         </p:txBody>
       </p:sp>
@@ -3346,8 +3347,8 @@
         </p:nvSpPr>
         <p:spPr>
           <a:xfrm>
-            <a:off x="811107" y="5368411"/>
-            <a:ext cx="3337560" cy="960120"/>
+            <a:off x="750147" y="4766431"/>
+            <a:ext cx="3337560" cy="783167"/>
           </a:xfrm>
           <a:prstGeom prst="rect">
             <a:avLst/>
@@ -3415,7 +3416,7 @@
         </p:nvSpPr>
         <p:spPr>
           <a:xfrm>
-            <a:off x="811107" y="557104"/>
+            <a:off x="750147" y="259924"/>
             <a:ext cx="3337560" cy="960120"/>
           </a:xfrm>
           <a:prstGeom prst="rect">
@@ -3489,7 +3490,7 @@
         </p:nvGrpSpPr>
         <p:grpSpPr>
           <a:xfrm>
-            <a:off x="811107" y="1929674"/>
+            <a:off x="750147" y="1464854"/>
             <a:ext cx="3337560" cy="3070860"/>
             <a:chOff x="7315200" y="3329940"/>
             <a:chExt cx="3337560" cy="3070860"/>
@@ -3890,23 +3891,7 @@
                     <a:schemeClr val="tx1"/>
                   </a:solidFill>
                 </a:rPr>
-                <a:t>(</a:t>
-              </a:r>
-              <a:r>
-                <a:rPr lang="en-US" altLang="zh-CN" dirty="0" err="1">
-                  <a:solidFill>
-                    <a:schemeClr val="tx1"/>
-                  </a:solidFill>
-                </a:rPr>
-                <a:t>hal</a:t>
-              </a:r>
-              <a:r>
-                <a:rPr lang="en-US" altLang="zh-CN" dirty="0">
-                  <a:solidFill>
-                    <a:schemeClr val="tx1"/>
-                  </a:solidFill>
-                </a:rPr>
-                <a:t>)</a:t>
+                <a:t>(hal)</a:t>
               </a:r>
               <a:endParaRPr lang="en-US" dirty="0">
                 <a:solidFill>
@@ -4086,6 +4071,189 @@
               <a:rPr lang="en-US" dirty="0"/>
               <a:t>HOST VEDIO</a:t>
             </a:r>
+          </a:p>
+        </p:txBody>
+      </p:sp>
+      <p:sp>
+        <p:nvSpPr>
+          <p:cNvPr id="15" name="Rectangle 14">
+            <a:extLst>
+              <a:ext uri="{FF2B5EF4-FFF2-40B4-BE49-F238E27FC236}">
+                <a16:creationId xmlns:a16="http://schemas.microsoft.com/office/drawing/2014/main" id="{A125B918-02E1-409E-AE38-38562FB9D974}"/>
+              </a:ext>
+            </a:extLst>
+          </p:cNvPr>
+          <p:cNvSpPr/>
+          <p:nvPr/>
+        </p:nvSpPr>
+        <p:spPr>
+          <a:xfrm>
+            <a:off x="750147" y="5826035"/>
+            <a:ext cx="819573" cy="783167"/>
+          </a:xfrm>
+          <a:prstGeom prst="rect">
+            <a:avLst/>
+          </a:prstGeom>
+        </p:spPr>
+        <p:style>
+          <a:lnRef idx="2">
+            <a:schemeClr val="accent1">
+              <a:shade val="50000"/>
+            </a:schemeClr>
+          </a:lnRef>
+          <a:fillRef idx="1">
+            <a:schemeClr val="accent1"/>
+          </a:fillRef>
+          <a:effectRef idx="0">
+            <a:schemeClr val="accent1"/>
+          </a:effectRef>
+          <a:fontRef idx="minor">
+            <a:schemeClr val="lt1"/>
+          </a:fontRef>
+        </p:style>
+        <p:txBody>
+          <a:bodyPr rtlCol="0" anchor="ctr"/>
+          <a:lstStyle/>
+          <a:p>
+            <a:pPr algn="ctr"/>
+            <a:r>
+              <a:rPr lang="en-US" altLang="zh-CN" sz="1400" dirty="0"/>
+              <a:t>USB</a:t>
+            </a:r>
+          </a:p>
+          <a:p>
+            <a:pPr algn="ctr"/>
+            <a:r>
+              <a:rPr lang="zh-CN" altLang="en-US" sz="1400" dirty="0"/>
+              <a:t>控制器</a:t>
+            </a:r>
+            <a:r>
+              <a:rPr lang="en-US" altLang="zh-CN" sz="1400" dirty="0"/>
+              <a:t>0</a:t>
+            </a:r>
+            <a:endParaRPr lang="en-US" sz="1400" dirty="0"/>
+          </a:p>
+        </p:txBody>
+      </p:sp>
+      <p:sp>
+        <p:nvSpPr>
+          <p:cNvPr id="17" name="Rectangle 16">
+            <a:extLst>
+              <a:ext uri="{FF2B5EF4-FFF2-40B4-BE49-F238E27FC236}">
+                <a16:creationId xmlns:a16="http://schemas.microsoft.com/office/drawing/2014/main" id="{9DCD8184-3FE8-4544-A513-28CB08F033C6}"/>
+              </a:ext>
+            </a:extLst>
+          </p:cNvPr>
+          <p:cNvSpPr/>
+          <p:nvPr/>
+        </p:nvSpPr>
+        <p:spPr>
+          <a:xfrm>
+            <a:off x="1993900" y="5826034"/>
+            <a:ext cx="819573" cy="783167"/>
+          </a:xfrm>
+          <a:prstGeom prst="rect">
+            <a:avLst/>
+          </a:prstGeom>
+        </p:spPr>
+        <p:style>
+          <a:lnRef idx="2">
+            <a:schemeClr val="accent1">
+              <a:shade val="50000"/>
+            </a:schemeClr>
+          </a:lnRef>
+          <a:fillRef idx="1">
+            <a:schemeClr val="accent1"/>
+          </a:fillRef>
+          <a:effectRef idx="0">
+            <a:schemeClr val="accent1"/>
+          </a:effectRef>
+          <a:fontRef idx="minor">
+            <a:schemeClr val="lt1"/>
+          </a:fontRef>
+        </p:style>
+        <p:txBody>
+          <a:bodyPr rtlCol="0" anchor="ctr"/>
+          <a:lstStyle/>
+          <a:p>
+            <a:pPr algn="ctr"/>
+            <a:r>
+              <a:rPr lang="en-US" altLang="zh-CN" sz="1400" dirty="0"/>
+              <a:t>USB</a:t>
+            </a:r>
+          </a:p>
+          <a:p>
+            <a:pPr algn="ctr"/>
+            <a:r>
+              <a:rPr lang="zh-CN" altLang="en-US" sz="1400" dirty="0"/>
+              <a:t>控制器</a:t>
+            </a:r>
+            <a:r>
+              <a:rPr lang="en-US" altLang="zh-CN" sz="1400" dirty="0"/>
+              <a:t>1</a:t>
+            </a:r>
+            <a:endParaRPr lang="en-US" sz="1400" dirty="0"/>
+          </a:p>
+        </p:txBody>
+      </p:sp>
+      <p:sp>
+        <p:nvSpPr>
+          <p:cNvPr id="19" name="Rectangle 18">
+            <a:extLst>
+              <a:ext uri="{FF2B5EF4-FFF2-40B4-BE49-F238E27FC236}">
+                <a16:creationId xmlns:a16="http://schemas.microsoft.com/office/drawing/2014/main" id="{810FAA45-2CD6-4D16-9B5E-ACE0E0837103}"/>
+              </a:ext>
+            </a:extLst>
+          </p:cNvPr>
+          <p:cNvSpPr/>
+          <p:nvPr/>
+        </p:nvSpPr>
+        <p:spPr>
+          <a:xfrm>
+            <a:off x="3207174" y="5826033"/>
+            <a:ext cx="869524" cy="783167"/>
+          </a:xfrm>
+          <a:prstGeom prst="rect">
+            <a:avLst/>
+          </a:prstGeom>
+        </p:spPr>
+        <p:style>
+          <a:lnRef idx="2">
+            <a:schemeClr val="accent1">
+              <a:shade val="50000"/>
+            </a:schemeClr>
+          </a:lnRef>
+          <a:fillRef idx="1">
+            <a:schemeClr val="accent1"/>
+          </a:fillRef>
+          <a:effectRef idx="0">
+            <a:schemeClr val="accent1"/>
+          </a:effectRef>
+          <a:fontRef idx="minor">
+            <a:schemeClr val="lt1"/>
+          </a:fontRef>
+        </p:style>
+        <p:txBody>
+          <a:bodyPr rtlCol="0" anchor="ctr"/>
+          <a:lstStyle/>
+          <a:p>
+            <a:pPr algn="ctr"/>
+            <a:r>
+              <a:rPr lang="en-US" altLang="zh-CN" sz="1400" dirty="0"/>
+              <a:t>USB</a:t>
+            </a:r>
+          </a:p>
+          <a:p>
+            <a:pPr algn="ctr"/>
+            <a:r>
+              <a:rPr lang="zh-CN" altLang="en-US" sz="1400" dirty="0"/>
+              <a:t>控制器</a:t>
+            </a:r>
+            <a:r>
+              <a:rPr lang="en-US" altLang="zh-CN" sz="1400" dirty="0"/>
+              <a:t>N</a:t>
+            </a:r>
+            <a:endParaRPr lang="en-US" sz="1400" dirty="0"/>
           </a:p>
         </p:txBody>
       </p:sp>
@@ -4119,6 +4287,1412 @@
           <a:chExt cx="0" cy="0"/>
         </a:xfrm>
       </p:grpSpPr>
+      <p:cxnSp>
+        <p:nvCxnSpPr>
+          <p:cNvPr id="3" name="Straight Arrow Connector 2">
+            <a:extLst>
+              <a:ext uri="{FF2B5EF4-FFF2-40B4-BE49-F238E27FC236}">
+                <a16:creationId xmlns:a16="http://schemas.microsoft.com/office/drawing/2014/main" id="{58CBB00C-2919-486D-9DC2-F0C57BB5228B}"/>
+              </a:ext>
+            </a:extLst>
+          </p:cNvPr>
+          <p:cNvCxnSpPr>
+            <a:cxnSpLocks/>
+          </p:cNvCxnSpPr>
+          <p:nvPr/>
+        </p:nvCxnSpPr>
+        <p:spPr>
+          <a:xfrm>
+            <a:off x="609600" y="5120640"/>
+            <a:ext cx="6908800" cy="0"/>
+          </a:xfrm>
+          <a:prstGeom prst="straightConnector1">
+            <a:avLst/>
+          </a:prstGeom>
+          <a:ln>
+            <a:tailEnd type="triangle"/>
+          </a:ln>
+        </p:spPr>
+        <p:style>
+          <a:lnRef idx="1">
+            <a:schemeClr val="accent1"/>
+          </a:lnRef>
+          <a:fillRef idx="0">
+            <a:schemeClr val="accent1"/>
+          </a:fillRef>
+          <a:effectRef idx="0">
+            <a:schemeClr val="accent1"/>
+          </a:effectRef>
+          <a:fontRef idx="minor">
+            <a:schemeClr val="tx1"/>
+          </a:fontRef>
+        </p:style>
+      </p:cxnSp>
+      <p:sp>
+        <p:nvSpPr>
+          <p:cNvPr id="6" name="Rectangle 5">
+            <a:extLst>
+              <a:ext uri="{FF2B5EF4-FFF2-40B4-BE49-F238E27FC236}">
+                <a16:creationId xmlns:a16="http://schemas.microsoft.com/office/drawing/2014/main" id="{A6C445D4-EBBC-4028-96B1-3AAE34FDAAF6}"/>
+              </a:ext>
+            </a:extLst>
+          </p:cNvPr>
+          <p:cNvSpPr/>
+          <p:nvPr/>
+        </p:nvSpPr>
+        <p:spPr>
+          <a:xfrm>
+            <a:off x="1005840" y="2727960"/>
+            <a:ext cx="381000" cy="2194560"/>
+          </a:xfrm>
+          <a:prstGeom prst="rect">
+            <a:avLst/>
+          </a:prstGeom>
+        </p:spPr>
+        <p:style>
+          <a:lnRef idx="2">
+            <a:schemeClr val="accent1">
+              <a:shade val="50000"/>
+            </a:schemeClr>
+          </a:lnRef>
+          <a:fillRef idx="1">
+            <a:schemeClr val="accent1"/>
+          </a:fillRef>
+          <a:effectRef idx="0">
+            <a:schemeClr val="accent1"/>
+          </a:effectRef>
+          <a:fontRef idx="minor">
+            <a:schemeClr val="lt1"/>
+          </a:fontRef>
+        </p:style>
+        <p:txBody>
+          <a:bodyPr rtlCol="0" anchor="ctr"/>
+          <a:lstStyle/>
+          <a:p>
+            <a:pPr algn="ctr"/>
+            <a:r>
+              <a:rPr lang="en-US" dirty="0"/>
+              <a:t>SETUP</a:t>
+            </a:r>
+          </a:p>
+        </p:txBody>
+      </p:sp>
+      <p:sp>
+        <p:nvSpPr>
+          <p:cNvPr id="8" name="Rectangle 7">
+            <a:extLst>
+              <a:ext uri="{FF2B5EF4-FFF2-40B4-BE49-F238E27FC236}">
+                <a16:creationId xmlns:a16="http://schemas.microsoft.com/office/drawing/2014/main" id="{C38F37E0-CC20-4C80-B146-AFEB4AF3CCB8}"/>
+              </a:ext>
+            </a:extLst>
+          </p:cNvPr>
+          <p:cNvSpPr/>
+          <p:nvPr/>
+        </p:nvSpPr>
+        <p:spPr>
+          <a:xfrm>
+            <a:off x="2005368" y="2727960"/>
+            <a:ext cx="381000" cy="2194560"/>
+          </a:xfrm>
+          <a:prstGeom prst="rect">
+            <a:avLst/>
+          </a:prstGeom>
+          <a:solidFill>
+            <a:schemeClr val="bg1">
+              <a:lumMod val="95000"/>
+            </a:schemeClr>
+          </a:solidFill>
+        </p:spPr>
+        <p:style>
+          <a:lnRef idx="2">
+            <a:schemeClr val="accent1">
+              <a:shade val="50000"/>
+            </a:schemeClr>
+          </a:lnRef>
+          <a:fillRef idx="1">
+            <a:schemeClr val="accent1"/>
+          </a:fillRef>
+          <a:effectRef idx="0">
+            <a:schemeClr val="accent1"/>
+          </a:effectRef>
+          <a:fontRef idx="minor">
+            <a:schemeClr val="lt1"/>
+          </a:fontRef>
+        </p:style>
+        <p:txBody>
+          <a:bodyPr rtlCol="0" anchor="ctr"/>
+          <a:lstStyle/>
+          <a:p>
+            <a:pPr algn="ctr"/>
+            <a:r>
+              <a:rPr lang="en-US" dirty="0">
+                <a:solidFill>
+                  <a:schemeClr val="tx2"/>
+                </a:solidFill>
+              </a:rPr>
+              <a:t>ACK</a:t>
+            </a:r>
+          </a:p>
+        </p:txBody>
+      </p:sp>
+      <p:sp>
+        <p:nvSpPr>
+          <p:cNvPr id="9" name="Rectangle 8">
+            <a:extLst>
+              <a:ext uri="{FF2B5EF4-FFF2-40B4-BE49-F238E27FC236}">
+                <a16:creationId xmlns:a16="http://schemas.microsoft.com/office/drawing/2014/main" id="{DD17B5FF-83D9-4E58-AB74-F8E6EE4239C5}"/>
+              </a:ext>
+            </a:extLst>
+          </p:cNvPr>
+          <p:cNvSpPr/>
+          <p:nvPr/>
+        </p:nvSpPr>
+        <p:spPr>
+          <a:xfrm>
+            <a:off x="1505604" y="2727960"/>
+            <a:ext cx="381000" cy="2194560"/>
+          </a:xfrm>
+          <a:prstGeom prst="rect">
+            <a:avLst/>
+          </a:prstGeom>
+        </p:spPr>
+        <p:style>
+          <a:lnRef idx="2">
+            <a:schemeClr val="accent1">
+              <a:shade val="50000"/>
+            </a:schemeClr>
+          </a:lnRef>
+          <a:fillRef idx="1">
+            <a:schemeClr val="accent1"/>
+          </a:fillRef>
+          <a:effectRef idx="0">
+            <a:schemeClr val="accent1"/>
+          </a:effectRef>
+          <a:fontRef idx="minor">
+            <a:schemeClr val="lt1"/>
+          </a:fontRef>
+        </p:style>
+        <p:txBody>
+          <a:bodyPr rtlCol="0" anchor="ctr"/>
+          <a:lstStyle/>
+          <a:p>
+            <a:pPr algn="ctr"/>
+            <a:r>
+              <a:rPr lang="en-US" dirty="0">
+                <a:solidFill>
+                  <a:schemeClr val="bg1"/>
+                </a:solidFill>
+              </a:rPr>
+              <a:t>DATA0</a:t>
+            </a:r>
+          </a:p>
+        </p:txBody>
+      </p:sp>
+      <p:sp>
+        <p:nvSpPr>
+          <p:cNvPr id="10" name="Rectangle 9">
+            <a:extLst>
+              <a:ext uri="{FF2B5EF4-FFF2-40B4-BE49-F238E27FC236}">
+                <a16:creationId xmlns:a16="http://schemas.microsoft.com/office/drawing/2014/main" id="{3DC7C2C3-70DC-49F3-83FD-AE6D275C5770}"/>
+              </a:ext>
+            </a:extLst>
+          </p:cNvPr>
+          <p:cNvSpPr/>
+          <p:nvPr/>
+        </p:nvSpPr>
+        <p:spPr>
+          <a:xfrm>
+            <a:off x="1196340" y="5318761"/>
+            <a:ext cx="381000" cy="502920"/>
+          </a:xfrm>
+          <a:prstGeom prst="rect">
+            <a:avLst/>
+          </a:prstGeom>
+        </p:spPr>
+        <p:style>
+          <a:lnRef idx="2">
+            <a:schemeClr val="accent1">
+              <a:shade val="50000"/>
+            </a:schemeClr>
+          </a:lnRef>
+          <a:fillRef idx="1">
+            <a:schemeClr val="accent1"/>
+          </a:fillRef>
+          <a:effectRef idx="0">
+            <a:schemeClr val="accent1"/>
+          </a:effectRef>
+          <a:fontRef idx="minor">
+            <a:schemeClr val="lt1"/>
+          </a:fontRef>
+        </p:style>
+        <p:txBody>
+          <a:bodyPr rtlCol="0" anchor="ctr"/>
+          <a:lstStyle/>
+          <a:p>
+            <a:pPr algn="ctr"/>
+            <a:endParaRPr lang="en-US" dirty="0"/>
+          </a:p>
+        </p:txBody>
+      </p:sp>
+      <p:sp>
+        <p:nvSpPr>
+          <p:cNvPr id="11" name="Rectangle 10">
+            <a:extLst>
+              <a:ext uri="{FF2B5EF4-FFF2-40B4-BE49-F238E27FC236}">
+                <a16:creationId xmlns:a16="http://schemas.microsoft.com/office/drawing/2014/main" id="{843A1A9A-90ED-4F1D-B23E-B94AA136D820}"/>
+              </a:ext>
+            </a:extLst>
+          </p:cNvPr>
+          <p:cNvSpPr/>
+          <p:nvPr/>
+        </p:nvSpPr>
+        <p:spPr>
+          <a:xfrm>
+            <a:off x="1196340" y="6019801"/>
+            <a:ext cx="381000" cy="502919"/>
+          </a:xfrm>
+          <a:prstGeom prst="rect">
+            <a:avLst/>
+          </a:prstGeom>
+          <a:solidFill>
+            <a:schemeClr val="bg1">
+              <a:lumMod val="95000"/>
+            </a:schemeClr>
+          </a:solidFill>
+        </p:spPr>
+        <p:style>
+          <a:lnRef idx="2">
+            <a:schemeClr val="accent1">
+              <a:shade val="50000"/>
+            </a:schemeClr>
+          </a:lnRef>
+          <a:fillRef idx="1">
+            <a:schemeClr val="accent1"/>
+          </a:fillRef>
+          <a:effectRef idx="0">
+            <a:schemeClr val="accent1"/>
+          </a:effectRef>
+          <a:fontRef idx="minor">
+            <a:schemeClr val="lt1"/>
+          </a:fontRef>
+        </p:style>
+        <p:txBody>
+          <a:bodyPr rtlCol="0" anchor="ctr"/>
+          <a:lstStyle/>
+          <a:p>
+            <a:pPr algn="ctr"/>
+            <a:endParaRPr lang="en-US" dirty="0">
+              <a:solidFill>
+                <a:schemeClr val="tx2"/>
+              </a:solidFill>
+            </a:endParaRPr>
+          </a:p>
+        </p:txBody>
+      </p:sp>
+      <p:sp>
+        <p:nvSpPr>
+          <p:cNvPr id="12" name="TextBox 11">
+            <a:extLst>
+              <a:ext uri="{FF2B5EF4-FFF2-40B4-BE49-F238E27FC236}">
+                <a16:creationId xmlns:a16="http://schemas.microsoft.com/office/drawing/2014/main" id="{FC533C83-22BE-40B4-9CB3-20A137FBD04B}"/>
+              </a:ext>
+            </a:extLst>
+          </p:cNvPr>
+          <p:cNvSpPr txBox="1"/>
+          <p:nvPr/>
+        </p:nvSpPr>
+        <p:spPr>
+          <a:xfrm>
+            <a:off x="1737360" y="5383436"/>
+            <a:ext cx="1811714" cy="369332"/>
+          </a:xfrm>
+          <a:prstGeom prst="rect">
+            <a:avLst/>
+          </a:prstGeom>
+          <a:noFill/>
+        </p:spPr>
+        <p:txBody>
+          <a:bodyPr wrap="none" rtlCol="0">
+            <a:spAutoFit/>
+          </a:bodyPr>
+          <a:lstStyle/>
+          <a:p>
+            <a:r>
+              <a:rPr lang="zh-CN" altLang="en-US" dirty="0"/>
+              <a:t>包，方向：</a:t>
+            </a:r>
+            <a:r>
+              <a:rPr lang="en-US" dirty="0"/>
+              <a:t>H-&gt;D</a:t>
+            </a:r>
+          </a:p>
+        </p:txBody>
+      </p:sp>
+      <p:sp>
+        <p:nvSpPr>
+          <p:cNvPr id="13" name="TextBox 12">
+            <a:extLst>
+              <a:ext uri="{FF2B5EF4-FFF2-40B4-BE49-F238E27FC236}">
+                <a16:creationId xmlns:a16="http://schemas.microsoft.com/office/drawing/2014/main" id="{4776DC2B-3711-4692-BA18-04751C0C4660}"/>
+              </a:ext>
+            </a:extLst>
+          </p:cNvPr>
+          <p:cNvSpPr txBox="1"/>
+          <p:nvPr/>
+        </p:nvSpPr>
+        <p:spPr>
+          <a:xfrm>
+            <a:off x="1737360" y="6065521"/>
+            <a:ext cx="1864613" cy="369332"/>
+          </a:xfrm>
+          <a:prstGeom prst="rect">
+            <a:avLst/>
+          </a:prstGeom>
+          <a:noFill/>
+        </p:spPr>
+        <p:txBody>
+          <a:bodyPr wrap="none" rtlCol="0">
+            <a:spAutoFit/>
+          </a:bodyPr>
+          <a:lstStyle/>
+          <a:p>
+            <a:r>
+              <a:rPr lang="zh-CN" altLang="en-US" dirty="0"/>
+              <a:t>包，方向： </a:t>
+            </a:r>
+            <a:r>
+              <a:rPr lang="en-US" dirty="0"/>
+              <a:t>D-&gt;H</a:t>
+            </a:r>
+          </a:p>
+        </p:txBody>
+      </p:sp>
+      <p:cxnSp>
+        <p:nvCxnSpPr>
+          <p:cNvPr id="15" name="Straight Arrow Connector 14">
+            <a:extLst>
+              <a:ext uri="{FF2B5EF4-FFF2-40B4-BE49-F238E27FC236}">
+                <a16:creationId xmlns:a16="http://schemas.microsoft.com/office/drawing/2014/main" id="{16512693-B957-4701-9CEF-4EC45006A545}"/>
+              </a:ext>
+            </a:extLst>
+          </p:cNvPr>
+          <p:cNvCxnSpPr/>
+          <p:nvPr/>
+        </p:nvCxnSpPr>
+        <p:spPr>
+          <a:xfrm>
+            <a:off x="1196340" y="1828800"/>
+            <a:ext cx="0" cy="792480"/>
+          </a:xfrm>
+          <a:prstGeom prst="straightConnector1">
+            <a:avLst/>
+          </a:prstGeom>
+          <a:ln>
+            <a:tailEnd type="triangle"/>
+          </a:ln>
+        </p:spPr>
+        <p:style>
+          <a:lnRef idx="1">
+            <a:schemeClr val="accent1"/>
+          </a:lnRef>
+          <a:fillRef idx="0">
+            <a:schemeClr val="accent1"/>
+          </a:fillRef>
+          <a:effectRef idx="0">
+            <a:schemeClr val="accent1"/>
+          </a:effectRef>
+          <a:fontRef idx="minor">
+            <a:schemeClr val="tx1"/>
+          </a:fontRef>
+        </p:style>
+      </p:cxnSp>
+      <p:cxnSp>
+        <p:nvCxnSpPr>
+          <p:cNvPr id="16" name="Straight Arrow Connector 15">
+            <a:extLst>
+              <a:ext uri="{FF2B5EF4-FFF2-40B4-BE49-F238E27FC236}">
+                <a16:creationId xmlns:a16="http://schemas.microsoft.com/office/drawing/2014/main" id="{BDD3F667-57D2-4155-972E-66FA7E75D1F1}"/>
+              </a:ext>
+            </a:extLst>
+          </p:cNvPr>
+          <p:cNvCxnSpPr/>
+          <p:nvPr/>
+        </p:nvCxnSpPr>
+        <p:spPr>
+          <a:xfrm>
+            <a:off x="1696104" y="1828800"/>
+            <a:ext cx="0" cy="792480"/>
+          </a:xfrm>
+          <a:prstGeom prst="straightConnector1">
+            <a:avLst/>
+          </a:prstGeom>
+          <a:ln>
+            <a:tailEnd type="triangle"/>
+          </a:ln>
+        </p:spPr>
+        <p:style>
+          <a:lnRef idx="1">
+            <a:schemeClr val="accent1"/>
+          </a:lnRef>
+          <a:fillRef idx="0">
+            <a:schemeClr val="accent1"/>
+          </a:fillRef>
+          <a:effectRef idx="0">
+            <a:schemeClr val="accent1"/>
+          </a:effectRef>
+          <a:fontRef idx="minor">
+            <a:schemeClr val="tx1"/>
+          </a:fontRef>
+        </p:style>
+      </p:cxnSp>
+      <p:cxnSp>
+        <p:nvCxnSpPr>
+          <p:cNvPr id="17" name="Straight Arrow Connector 16">
+            <a:extLst>
+              <a:ext uri="{FF2B5EF4-FFF2-40B4-BE49-F238E27FC236}">
+                <a16:creationId xmlns:a16="http://schemas.microsoft.com/office/drawing/2014/main" id="{2A62FFDA-4DF3-4457-9C54-FD4753114107}"/>
+              </a:ext>
+            </a:extLst>
+          </p:cNvPr>
+          <p:cNvCxnSpPr>
+            <a:cxnSpLocks/>
+          </p:cNvCxnSpPr>
+          <p:nvPr/>
+        </p:nvCxnSpPr>
+        <p:spPr>
+          <a:xfrm flipV="1">
+            <a:off x="2195868" y="1828800"/>
+            <a:ext cx="0" cy="792480"/>
+          </a:xfrm>
+          <a:prstGeom prst="straightConnector1">
+            <a:avLst/>
+          </a:prstGeom>
+          <a:ln>
+            <a:tailEnd type="triangle"/>
+          </a:ln>
+        </p:spPr>
+        <p:style>
+          <a:lnRef idx="1">
+            <a:schemeClr val="accent1"/>
+          </a:lnRef>
+          <a:fillRef idx="0">
+            <a:schemeClr val="accent1"/>
+          </a:fillRef>
+          <a:effectRef idx="0">
+            <a:schemeClr val="accent1"/>
+          </a:effectRef>
+          <a:fontRef idx="minor">
+            <a:schemeClr val="tx1"/>
+          </a:fontRef>
+        </p:style>
+      </p:cxnSp>
+      <p:sp>
+        <p:nvSpPr>
+          <p:cNvPr id="21" name="Rectangle 20">
+            <a:extLst>
+              <a:ext uri="{FF2B5EF4-FFF2-40B4-BE49-F238E27FC236}">
+                <a16:creationId xmlns:a16="http://schemas.microsoft.com/office/drawing/2014/main" id="{5B743938-1CDB-4A7C-9F52-7E6F362518F1}"/>
+              </a:ext>
+            </a:extLst>
+          </p:cNvPr>
+          <p:cNvSpPr/>
+          <p:nvPr/>
+        </p:nvSpPr>
+        <p:spPr>
+          <a:xfrm>
+            <a:off x="3177540" y="2727961"/>
+            <a:ext cx="381000" cy="2194560"/>
+          </a:xfrm>
+          <a:prstGeom prst="rect">
+            <a:avLst/>
+          </a:prstGeom>
+        </p:spPr>
+        <p:style>
+          <a:lnRef idx="2">
+            <a:schemeClr val="accent1">
+              <a:shade val="50000"/>
+            </a:schemeClr>
+          </a:lnRef>
+          <a:fillRef idx="1">
+            <a:schemeClr val="accent1"/>
+          </a:fillRef>
+          <a:effectRef idx="0">
+            <a:schemeClr val="accent1"/>
+          </a:effectRef>
+          <a:fontRef idx="minor">
+            <a:schemeClr val="lt1"/>
+          </a:fontRef>
+        </p:style>
+        <p:txBody>
+          <a:bodyPr rtlCol="0" anchor="ctr"/>
+          <a:lstStyle/>
+          <a:p>
+            <a:pPr algn="ctr"/>
+            <a:r>
+              <a:rPr lang="en-US" dirty="0"/>
+              <a:t>IN</a:t>
+            </a:r>
+          </a:p>
+        </p:txBody>
+      </p:sp>
+      <p:sp>
+        <p:nvSpPr>
+          <p:cNvPr id="22" name="Rectangle 21">
+            <a:extLst>
+              <a:ext uri="{FF2B5EF4-FFF2-40B4-BE49-F238E27FC236}">
+                <a16:creationId xmlns:a16="http://schemas.microsoft.com/office/drawing/2014/main" id="{0E51D3F4-DD43-4AE4-B940-8E8D6A8EE01D}"/>
+              </a:ext>
+            </a:extLst>
+          </p:cNvPr>
+          <p:cNvSpPr/>
+          <p:nvPr/>
+        </p:nvSpPr>
+        <p:spPr>
+          <a:xfrm>
+            <a:off x="4177068" y="2727961"/>
+            <a:ext cx="381000" cy="2194560"/>
+          </a:xfrm>
+          <a:prstGeom prst="rect">
+            <a:avLst/>
+          </a:prstGeom>
+          <a:solidFill>
+            <a:schemeClr val="accent1"/>
+          </a:solidFill>
+        </p:spPr>
+        <p:style>
+          <a:lnRef idx="2">
+            <a:schemeClr val="accent1">
+              <a:shade val="50000"/>
+            </a:schemeClr>
+          </a:lnRef>
+          <a:fillRef idx="1">
+            <a:schemeClr val="accent1"/>
+          </a:fillRef>
+          <a:effectRef idx="0">
+            <a:schemeClr val="accent1"/>
+          </a:effectRef>
+          <a:fontRef idx="minor">
+            <a:schemeClr val="lt1"/>
+          </a:fontRef>
+        </p:style>
+        <p:txBody>
+          <a:bodyPr rtlCol="0" anchor="ctr"/>
+          <a:lstStyle/>
+          <a:p>
+            <a:pPr algn="ctr"/>
+            <a:r>
+              <a:rPr lang="en-US" dirty="0">
+                <a:solidFill>
+                  <a:schemeClr val="bg1"/>
+                </a:solidFill>
+              </a:rPr>
+              <a:t>ACK</a:t>
+            </a:r>
+          </a:p>
+        </p:txBody>
+      </p:sp>
+      <p:sp>
+        <p:nvSpPr>
+          <p:cNvPr id="23" name="Rectangle 22">
+            <a:extLst>
+              <a:ext uri="{FF2B5EF4-FFF2-40B4-BE49-F238E27FC236}">
+                <a16:creationId xmlns:a16="http://schemas.microsoft.com/office/drawing/2014/main" id="{AEEDED11-6E5F-4B8A-873B-DF2C94510BDB}"/>
+              </a:ext>
+            </a:extLst>
+          </p:cNvPr>
+          <p:cNvSpPr/>
+          <p:nvPr/>
+        </p:nvSpPr>
+        <p:spPr>
+          <a:xfrm>
+            <a:off x="3677304" y="2727961"/>
+            <a:ext cx="381000" cy="2194560"/>
+          </a:xfrm>
+          <a:prstGeom prst="rect">
+            <a:avLst/>
+          </a:prstGeom>
+          <a:solidFill>
+            <a:schemeClr val="bg1">
+              <a:lumMod val="95000"/>
+            </a:schemeClr>
+          </a:solidFill>
+        </p:spPr>
+        <p:style>
+          <a:lnRef idx="2">
+            <a:schemeClr val="accent1">
+              <a:shade val="50000"/>
+            </a:schemeClr>
+          </a:lnRef>
+          <a:fillRef idx="1">
+            <a:schemeClr val="accent1"/>
+          </a:fillRef>
+          <a:effectRef idx="0">
+            <a:schemeClr val="accent1"/>
+          </a:effectRef>
+          <a:fontRef idx="minor">
+            <a:schemeClr val="lt1"/>
+          </a:fontRef>
+        </p:style>
+        <p:txBody>
+          <a:bodyPr rtlCol="0" anchor="ctr"/>
+          <a:lstStyle/>
+          <a:p>
+            <a:pPr algn="ctr"/>
+            <a:r>
+              <a:rPr lang="en-US" dirty="0">
+                <a:solidFill>
+                  <a:schemeClr val="tx1"/>
+                </a:solidFill>
+              </a:rPr>
+              <a:t>DATA1</a:t>
+            </a:r>
+          </a:p>
+        </p:txBody>
+      </p:sp>
+      <p:cxnSp>
+        <p:nvCxnSpPr>
+          <p:cNvPr id="24" name="Straight Arrow Connector 23">
+            <a:extLst>
+              <a:ext uri="{FF2B5EF4-FFF2-40B4-BE49-F238E27FC236}">
+                <a16:creationId xmlns:a16="http://schemas.microsoft.com/office/drawing/2014/main" id="{B5B7D70D-E1A3-41E9-88EA-084080F783E3}"/>
+              </a:ext>
+            </a:extLst>
+          </p:cNvPr>
+          <p:cNvCxnSpPr/>
+          <p:nvPr/>
+        </p:nvCxnSpPr>
+        <p:spPr>
+          <a:xfrm>
+            <a:off x="3368040" y="1828800"/>
+            <a:ext cx="0" cy="792480"/>
+          </a:xfrm>
+          <a:prstGeom prst="straightConnector1">
+            <a:avLst/>
+          </a:prstGeom>
+          <a:ln>
+            <a:tailEnd type="triangle"/>
+          </a:ln>
+        </p:spPr>
+        <p:style>
+          <a:lnRef idx="1">
+            <a:schemeClr val="accent1"/>
+          </a:lnRef>
+          <a:fillRef idx="0">
+            <a:schemeClr val="accent1"/>
+          </a:fillRef>
+          <a:effectRef idx="0">
+            <a:schemeClr val="accent1"/>
+          </a:effectRef>
+          <a:fontRef idx="minor">
+            <a:schemeClr val="tx1"/>
+          </a:fontRef>
+        </p:style>
+      </p:cxnSp>
+      <p:cxnSp>
+        <p:nvCxnSpPr>
+          <p:cNvPr id="27" name="Straight Arrow Connector 26">
+            <a:extLst>
+              <a:ext uri="{FF2B5EF4-FFF2-40B4-BE49-F238E27FC236}">
+                <a16:creationId xmlns:a16="http://schemas.microsoft.com/office/drawing/2014/main" id="{F8A7F509-3D91-4942-A221-3DAA896561D8}"/>
+              </a:ext>
+            </a:extLst>
+          </p:cNvPr>
+          <p:cNvCxnSpPr/>
+          <p:nvPr/>
+        </p:nvCxnSpPr>
+        <p:spPr>
+          <a:xfrm>
+            <a:off x="4367866" y="1828800"/>
+            <a:ext cx="0" cy="792480"/>
+          </a:xfrm>
+          <a:prstGeom prst="straightConnector1">
+            <a:avLst/>
+          </a:prstGeom>
+          <a:ln>
+            <a:tailEnd type="triangle"/>
+          </a:ln>
+        </p:spPr>
+        <p:style>
+          <a:lnRef idx="1">
+            <a:schemeClr val="accent1"/>
+          </a:lnRef>
+          <a:fillRef idx="0">
+            <a:schemeClr val="accent1"/>
+          </a:fillRef>
+          <a:effectRef idx="0">
+            <a:schemeClr val="accent1"/>
+          </a:effectRef>
+          <a:fontRef idx="minor">
+            <a:schemeClr val="tx1"/>
+          </a:fontRef>
+        </p:style>
+      </p:cxnSp>
+      <p:cxnSp>
+        <p:nvCxnSpPr>
+          <p:cNvPr id="28" name="Straight Arrow Connector 27">
+            <a:extLst>
+              <a:ext uri="{FF2B5EF4-FFF2-40B4-BE49-F238E27FC236}">
+                <a16:creationId xmlns:a16="http://schemas.microsoft.com/office/drawing/2014/main" id="{369C9D31-AA63-4460-979B-18692E064827}"/>
+              </a:ext>
+            </a:extLst>
+          </p:cNvPr>
+          <p:cNvCxnSpPr>
+            <a:cxnSpLocks/>
+          </p:cNvCxnSpPr>
+          <p:nvPr/>
+        </p:nvCxnSpPr>
+        <p:spPr>
+          <a:xfrm flipV="1">
+            <a:off x="3872268" y="1828800"/>
+            <a:ext cx="0" cy="792480"/>
+          </a:xfrm>
+          <a:prstGeom prst="straightConnector1">
+            <a:avLst/>
+          </a:prstGeom>
+          <a:ln>
+            <a:tailEnd type="triangle"/>
+          </a:ln>
+        </p:spPr>
+        <p:style>
+          <a:lnRef idx="1">
+            <a:schemeClr val="accent1"/>
+          </a:lnRef>
+          <a:fillRef idx="0">
+            <a:schemeClr val="accent1"/>
+          </a:fillRef>
+          <a:effectRef idx="0">
+            <a:schemeClr val="accent1"/>
+          </a:effectRef>
+          <a:fontRef idx="minor">
+            <a:schemeClr val="tx1"/>
+          </a:fontRef>
+        </p:style>
+      </p:cxnSp>
+      <p:sp>
+        <p:nvSpPr>
+          <p:cNvPr id="29" name="Rectangle 28">
+            <a:extLst>
+              <a:ext uri="{FF2B5EF4-FFF2-40B4-BE49-F238E27FC236}">
+                <a16:creationId xmlns:a16="http://schemas.microsoft.com/office/drawing/2014/main" id="{A8EC8419-23FC-491B-81C2-395DE6A15326}"/>
+              </a:ext>
+            </a:extLst>
+          </p:cNvPr>
+          <p:cNvSpPr/>
+          <p:nvPr/>
+        </p:nvSpPr>
+        <p:spPr>
+          <a:xfrm>
+            <a:off x="5349240" y="2727960"/>
+            <a:ext cx="381000" cy="2194560"/>
+          </a:xfrm>
+          <a:prstGeom prst="rect">
+            <a:avLst/>
+          </a:prstGeom>
+        </p:spPr>
+        <p:style>
+          <a:lnRef idx="2">
+            <a:schemeClr val="accent1">
+              <a:shade val="50000"/>
+            </a:schemeClr>
+          </a:lnRef>
+          <a:fillRef idx="1">
+            <a:schemeClr val="accent1"/>
+          </a:fillRef>
+          <a:effectRef idx="0">
+            <a:schemeClr val="accent1"/>
+          </a:effectRef>
+          <a:fontRef idx="minor">
+            <a:schemeClr val="lt1"/>
+          </a:fontRef>
+        </p:style>
+        <p:txBody>
+          <a:bodyPr rtlCol="0" anchor="ctr"/>
+          <a:lstStyle/>
+          <a:p>
+            <a:pPr algn="ctr"/>
+            <a:r>
+              <a:rPr lang="en-US" dirty="0"/>
+              <a:t>OUT</a:t>
+            </a:r>
+          </a:p>
+        </p:txBody>
+      </p:sp>
+      <p:sp>
+        <p:nvSpPr>
+          <p:cNvPr id="30" name="Rectangle 29">
+            <a:extLst>
+              <a:ext uri="{FF2B5EF4-FFF2-40B4-BE49-F238E27FC236}">
+                <a16:creationId xmlns:a16="http://schemas.microsoft.com/office/drawing/2014/main" id="{E00C31F8-15B5-4C56-9080-389D9095C87F}"/>
+              </a:ext>
+            </a:extLst>
+          </p:cNvPr>
+          <p:cNvSpPr/>
+          <p:nvPr/>
+        </p:nvSpPr>
+        <p:spPr>
+          <a:xfrm>
+            <a:off x="6348768" y="2727960"/>
+            <a:ext cx="381000" cy="2194560"/>
+          </a:xfrm>
+          <a:prstGeom prst="rect">
+            <a:avLst/>
+          </a:prstGeom>
+          <a:solidFill>
+            <a:schemeClr val="bg1">
+              <a:lumMod val="95000"/>
+            </a:schemeClr>
+          </a:solidFill>
+        </p:spPr>
+        <p:style>
+          <a:lnRef idx="2">
+            <a:schemeClr val="accent1">
+              <a:shade val="50000"/>
+            </a:schemeClr>
+          </a:lnRef>
+          <a:fillRef idx="1">
+            <a:schemeClr val="accent1"/>
+          </a:fillRef>
+          <a:effectRef idx="0">
+            <a:schemeClr val="accent1"/>
+          </a:effectRef>
+          <a:fontRef idx="minor">
+            <a:schemeClr val="lt1"/>
+          </a:fontRef>
+        </p:style>
+        <p:txBody>
+          <a:bodyPr rtlCol="0" anchor="ctr"/>
+          <a:lstStyle/>
+          <a:p>
+            <a:pPr algn="ctr"/>
+            <a:r>
+              <a:rPr lang="en-US" dirty="0">
+                <a:solidFill>
+                  <a:schemeClr val="tx2"/>
+                </a:solidFill>
+              </a:rPr>
+              <a:t>ACK</a:t>
+            </a:r>
+          </a:p>
+        </p:txBody>
+      </p:sp>
+      <p:sp>
+        <p:nvSpPr>
+          <p:cNvPr id="31" name="Rectangle 30">
+            <a:extLst>
+              <a:ext uri="{FF2B5EF4-FFF2-40B4-BE49-F238E27FC236}">
+                <a16:creationId xmlns:a16="http://schemas.microsoft.com/office/drawing/2014/main" id="{F534D8E8-4C78-433C-B5DA-21132C0AAAD4}"/>
+              </a:ext>
+            </a:extLst>
+          </p:cNvPr>
+          <p:cNvSpPr/>
+          <p:nvPr/>
+        </p:nvSpPr>
+        <p:spPr>
+          <a:xfrm>
+            <a:off x="5849004" y="2727960"/>
+            <a:ext cx="381000" cy="2194560"/>
+          </a:xfrm>
+          <a:prstGeom prst="rect">
+            <a:avLst/>
+          </a:prstGeom>
+        </p:spPr>
+        <p:style>
+          <a:lnRef idx="2">
+            <a:schemeClr val="accent1">
+              <a:shade val="50000"/>
+            </a:schemeClr>
+          </a:lnRef>
+          <a:fillRef idx="1">
+            <a:schemeClr val="accent1"/>
+          </a:fillRef>
+          <a:effectRef idx="0">
+            <a:schemeClr val="accent1"/>
+          </a:effectRef>
+          <a:fontRef idx="minor">
+            <a:schemeClr val="lt1"/>
+          </a:fontRef>
+        </p:style>
+        <p:txBody>
+          <a:bodyPr rtlCol="0" anchor="ctr"/>
+          <a:lstStyle/>
+          <a:p>
+            <a:pPr algn="ctr"/>
+            <a:r>
+              <a:rPr lang="en-US" dirty="0">
+                <a:solidFill>
+                  <a:schemeClr val="bg1"/>
+                </a:solidFill>
+              </a:rPr>
+              <a:t>DATA1</a:t>
+            </a:r>
+          </a:p>
+        </p:txBody>
+      </p:sp>
+      <p:cxnSp>
+        <p:nvCxnSpPr>
+          <p:cNvPr id="32" name="Straight Arrow Connector 31">
+            <a:extLst>
+              <a:ext uri="{FF2B5EF4-FFF2-40B4-BE49-F238E27FC236}">
+                <a16:creationId xmlns:a16="http://schemas.microsoft.com/office/drawing/2014/main" id="{15EE2B7D-F55A-4AEA-8ECB-386179FCDEB0}"/>
+              </a:ext>
+            </a:extLst>
+          </p:cNvPr>
+          <p:cNvCxnSpPr/>
+          <p:nvPr/>
+        </p:nvCxnSpPr>
+        <p:spPr>
+          <a:xfrm>
+            <a:off x="5539740" y="1828800"/>
+            <a:ext cx="0" cy="792480"/>
+          </a:xfrm>
+          <a:prstGeom prst="straightConnector1">
+            <a:avLst/>
+          </a:prstGeom>
+          <a:ln>
+            <a:tailEnd type="triangle"/>
+          </a:ln>
+        </p:spPr>
+        <p:style>
+          <a:lnRef idx="1">
+            <a:schemeClr val="accent1"/>
+          </a:lnRef>
+          <a:fillRef idx="0">
+            <a:schemeClr val="accent1"/>
+          </a:fillRef>
+          <a:effectRef idx="0">
+            <a:schemeClr val="accent1"/>
+          </a:effectRef>
+          <a:fontRef idx="minor">
+            <a:schemeClr val="tx1"/>
+          </a:fontRef>
+        </p:style>
+      </p:cxnSp>
+      <p:cxnSp>
+        <p:nvCxnSpPr>
+          <p:cNvPr id="33" name="Straight Arrow Connector 32">
+            <a:extLst>
+              <a:ext uri="{FF2B5EF4-FFF2-40B4-BE49-F238E27FC236}">
+                <a16:creationId xmlns:a16="http://schemas.microsoft.com/office/drawing/2014/main" id="{4EB9CD79-467E-4747-A697-AB0225420F93}"/>
+              </a:ext>
+            </a:extLst>
+          </p:cNvPr>
+          <p:cNvCxnSpPr/>
+          <p:nvPr/>
+        </p:nvCxnSpPr>
+        <p:spPr>
+          <a:xfrm>
+            <a:off x="6039504" y="1828800"/>
+            <a:ext cx="0" cy="792480"/>
+          </a:xfrm>
+          <a:prstGeom prst="straightConnector1">
+            <a:avLst/>
+          </a:prstGeom>
+          <a:ln>
+            <a:tailEnd type="triangle"/>
+          </a:ln>
+        </p:spPr>
+        <p:style>
+          <a:lnRef idx="1">
+            <a:schemeClr val="accent1"/>
+          </a:lnRef>
+          <a:fillRef idx="0">
+            <a:schemeClr val="accent1"/>
+          </a:fillRef>
+          <a:effectRef idx="0">
+            <a:schemeClr val="accent1"/>
+          </a:effectRef>
+          <a:fontRef idx="minor">
+            <a:schemeClr val="tx1"/>
+          </a:fontRef>
+        </p:style>
+      </p:cxnSp>
+      <p:cxnSp>
+        <p:nvCxnSpPr>
+          <p:cNvPr id="34" name="Straight Arrow Connector 33">
+            <a:extLst>
+              <a:ext uri="{FF2B5EF4-FFF2-40B4-BE49-F238E27FC236}">
+                <a16:creationId xmlns:a16="http://schemas.microsoft.com/office/drawing/2014/main" id="{123AC958-BF78-4901-B603-2C6E91BB9DCF}"/>
+              </a:ext>
+            </a:extLst>
+          </p:cNvPr>
+          <p:cNvCxnSpPr>
+            <a:cxnSpLocks/>
+          </p:cNvCxnSpPr>
+          <p:nvPr/>
+        </p:nvCxnSpPr>
+        <p:spPr>
+          <a:xfrm flipV="1">
+            <a:off x="6539268" y="1828800"/>
+            <a:ext cx="0" cy="792480"/>
+          </a:xfrm>
+          <a:prstGeom prst="straightConnector1">
+            <a:avLst/>
+          </a:prstGeom>
+          <a:ln>
+            <a:tailEnd type="triangle"/>
+          </a:ln>
+        </p:spPr>
+        <p:style>
+          <a:lnRef idx="1">
+            <a:schemeClr val="accent1"/>
+          </a:lnRef>
+          <a:fillRef idx="0">
+            <a:schemeClr val="accent1"/>
+          </a:fillRef>
+          <a:effectRef idx="0">
+            <a:schemeClr val="accent1"/>
+          </a:effectRef>
+          <a:fontRef idx="minor">
+            <a:schemeClr val="tx1"/>
+          </a:fontRef>
+        </p:style>
+      </p:cxnSp>
+      <p:sp>
+        <p:nvSpPr>
+          <p:cNvPr id="36" name="TextBox 35">
+            <a:extLst>
+              <a:ext uri="{FF2B5EF4-FFF2-40B4-BE49-F238E27FC236}">
+                <a16:creationId xmlns:a16="http://schemas.microsoft.com/office/drawing/2014/main" id="{BA6A8AEE-5497-43D6-8036-596BD07754C8}"/>
+              </a:ext>
+            </a:extLst>
+          </p:cNvPr>
+          <p:cNvSpPr txBox="1"/>
+          <p:nvPr/>
+        </p:nvSpPr>
+        <p:spPr>
+          <a:xfrm>
+            <a:off x="6872069" y="5134094"/>
+            <a:ext cx="646331" cy="369332"/>
+          </a:xfrm>
+          <a:prstGeom prst="rect">
+            <a:avLst/>
+          </a:prstGeom>
+          <a:noFill/>
+        </p:spPr>
+        <p:txBody>
+          <a:bodyPr wrap="none" rtlCol="0">
+            <a:spAutoFit/>
+          </a:bodyPr>
+          <a:lstStyle/>
+          <a:p>
+            <a:r>
+              <a:rPr lang="zh-CN" altLang="en-US" dirty="0"/>
+              <a:t>时间</a:t>
+            </a:r>
+            <a:endParaRPr lang="en-US" dirty="0"/>
+          </a:p>
+        </p:txBody>
+      </p:sp>
+      <p:cxnSp>
+        <p:nvCxnSpPr>
+          <p:cNvPr id="38" name="Straight Connector 37">
+            <a:extLst>
+              <a:ext uri="{FF2B5EF4-FFF2-40B4-BE49-F238E27FC236}">
+                <a16:creationId xmlns:a16="http://schemas.microsoft.com/office/drawing/2014/main" id="{864E31CC-1EDB-4BC1-87D9-60D101B6982E}"/>
+              </a:ext>
+            </a:extLst>
+          </p:cNvPr>
+          <p:cNvCxnSpPr/>
+          <p:nvPr/>
+        </p:nvCxnSpPr>
+        <p:spPr>
+          <a:xfrm>
+            <a:off x="1005840" y="1712685"/>
+            <a:ext cx="1380528" cy="0"/>
+          </a:xfrm>
+          <a:prstGeom prst="line">
+            <a:avLst/>
+          </a:prstGeom>
+        </p:spPr>
+        <p:style>
+          <a:lnRef idx="1">
+            <a:schemeClr val="accent1"/>
+          </a:lnRef>
+          <a:fillRef idx="0">
+            <a:schemeClr val="accent1"/>
+          </a:fillRef>
+          <a:effectRef idx="0">
+            <a:schemeClr val="accent1"/>
+          </a:effectRef>
+          <a:fontRef idx="minor">
+            <a:schemeClr val="tx1"/>
+          </a:fontRef>
+        </p:style>
+      </p:cxnSp>
+      <p:cxnSp>
+        <p:nvCxnSpPr>
+          <p:cNvPr id="39" name="Straight Connector 38">
+            <a:extLst>
+              <a:ext uri="{FF2B5EF4-FFF2-40B4-BE49-F238E27FC236}">
+                <a16:creationId xmlns:a16="http://schemas.microsoft.com/office/drawing/2014/main" id="{3D52D6F7-980D-456A-A820-B578C23D37DE}"/>
+              </a:ext>
+            </a:extLst>
+          </p:cNvPr>
+          <p:cNvCxnSpPr/>
+          <p:nvPr/>
+        </p:nvCxnSpPr>
+        <p:spPr>
+          <a:xfrm>
+            <a:off x="3177540" y="1712685"/>
+            <a:ext cx="1380528" cy="0"/>
+          </a:xfrm>
+          <a:prstGeom prst="line">
+            <a:avLst/>
+          </a:prstGeom>
+        </p:spPr>
+        <p:style>
+          <a:lnRef idx="1">
+            <a:schemeClr val="accent1"/>
+          </a:lnRef>
+          <a:fillRef idx="0">
+            <a:schemeClr val="accent1"/>
+          </a:fillRef>
+          <a:effectRef idx="0">
+            <a:schemeClr val="accent1"/>
+          </a:effectRef>
+          <a:fontRef idx="minor">
+            <a:schemeClr val="tx1"/>
+          </a:fontRef>
+        </p:style>
+      </p:cxnSp>
+      <p:cxnSp>
+        <p:nvCxnSpPr>
+          <p:cNvPr id="40" name="Straight Connector 39">
+            <a:extLst>
+              <a:ext uri="{FF2B5EF4-FFF2-40B4-BE49-F238E27FC236}">
+                <a16:creationId xmlns:a16="http://schemas.microsoft.com/office/drawing/2014/main" id="{18466AB4-3B97-4880-A89C-DC9D47E736EC}"/>
+              </a:ext>
+            </a:extLst>
+          </p:cNvPr>
+          <p:cNvCxnSpPr/>
+          <p:nvPr/>
+        </p:nvCxnSpPr>
+        <p:spPr>
+          <a:xfrm>
+            <a:off x="5349240" y="1712685"/>
+            <a:ext cx="1380528" cy="0"/>
+          </a:xfrm>
+          <a:prstGeom prst="line">
+            <a:avLst/>
+          </a:prstGeom>
+        </p:spPr>
+        <p:style>
+          <a:lnRef idx="1">
+            <a:schemeClr val="accent1"/>
+          </a:lnRef>
+          <a:fillRef idx="0">
+            <a:schemeClr val="accent1"/>
+          </a:fillRef>
+          <a:effectRef idx="0">
+            <a:schemeClr val="accent1"/>
+          </a:effectRef>
+          <a:fontRef idx="minor">
+            <a:schemeClr val="tx1"/>
+          </a:fontRef>
+        </p:style>
+      </p:cxnSp>
+      <p:sp>
+        <p:nvSpPr>
+          <p:cNvPr id="41" name="TextBox 40">
+            <a:extLst>
+              <a:ext uri="{FF2B5EF4-FFF2-40B4-BE49-F238E27FC236}">
+                <a16:creationId xmlns:a16="http://schemas.microsoft.com/office/drawing/2014/main" id="{442293E1-A756-45DC-A7B8-C84B1713B590}"/>
+              </a:ext>
+            </a:extLst>
+          </p:cNvPr>
+          <p:cNvSpPr txBox="1"/>
+          <p:nvPr/>
+        </p:nvSpPr>
+        <p:spPr>
+          <a:xfrm>
+            <a:off x="928394" y="1065044"/>
+            <a:ext cx="1535420" cy="646331"/>
+          </a:xfrm>
+          <a:prstGeom prst="rect">
+            <a:avLst/>
+          </a:prstGeom>
+          <a:noFill/>
+        </p:spPr>
+        <p:txBody>
+          <a:bodyPr wrap="none" rtlCol="0">
+            <a:spAutoFit/>
+          </a:bodyPr>
+          <a:lstStyle/>
+          <a:p>
+            <a:pPr algn="ctr"/>
+            <a:r>
+              <a:rPr lang="en-US" dirty="0"/>
+              <a:t>SETUP </a:t>
+            </a:r>
+          </a:p>
+          <a:p>
+            <a:pPr algn="ctr"/>
+            <a:r>
+              <a:rPr lang="en-US" dirty="0"/>
+              <a:t>TRANSACTION</a:t>
+            </a:r>
+          </a:p>
+        </p:txBody>
+      </p:sp>
+      <p:sp>
+        <p:nvSpPr>
+          <p:cNvPr id="42" name="TextBox 41">
+            <a:extLst>
+              <a:ext uri="{FF2B5EF4-FFF2-40B4-BE49-F238E27FC236}">
+                <a16:creationId xmlns:a16="http://schemas.microsoft.com/office/drawing/2014/main" id="{38019928-36F2-4B49-B5F0-5EB2E0B5A8A4}"/>
+              </a:ext>
+            </a:extLst>
+          </p:cNvPr>
+          <p:cNvSpPr txBox="1"/>
+          <p:nvPr/>
+        </p:nvSpPr>
+        <p:spPr>
+          <a:xfrm>
+            <a:off x="3100094" y="1065044"/>
+            <a:ext cx="1535420" cy="646331"/>
+          </a:xfrm>
+          <a:prstGeom prst="rect">
+            <a:avLst/>
+          </a:prstGeom>
+          <a:noFill/>
+        </p:spPr>
+        <p:txBody>
+          <a:bodyPr wrap="none" rtlCol="0">
+            <a:spAutoFit/>
+          </a:bodyPr>
+          <a:lstStyle/>
+          <a:p>
+            <a:pPr algn="ctr"/>
+            <a:r>
+              <a:rPr lang="en-US" dirty="0"/>
+              <a:t>IN </a:t>
+            </a:r>
+          </a:p>
+          <a:p>
+            <a:pPr algn="ctr"/>
+            <a:r>
+              <a:rPr lang="en-US" dirty="0"/>
+              <a:t>TRANSACTION</a:t>
+            </a:r>
+          </a:p>
+        </p:txBody>
+      </p:sp>
+      <p:sp>
+        <p:nvSpPr>
+          <p:cNvPr id="43" name="TextBox 42">
+            <a:extLst>
+              <a:ext uri="{FF2B5EF4-FFF2-40B4-BE49-F238E27FC236}">
+                <a16:creationId xmlns:a16="http://schemas.microsoft.com/office/drawing/2014/main" id="{E065E59A-538D-461E-A188-0E5594C61E60}"/>
+              </a:ext>
+            </a:extLst>
+          </p:cNvPr>
+          <p:cNvSpPr txBox="1"/>
+          <p:nvPr/>
+        </p:nvSpPr>
+        <p:spPr>
+          <a:xfrm>
+            <a:off x="5271794" y="1047217"/>
+            <a:ext cx="1535420" cy="646331"/>
+          </a:xfrm>
+          <a:prstGeom prst="rect">
+            <a:avLst/>
+          </a:prstGeom>
+          <a:noFill/>
+        </p:spPr>
+        <p:txBody>
+          <a:bodyPr wrap="none" rtlCol="0">
+            <a:spAutoFit/>
+          </a:bodyPr>
+          <a:lstStyle/>
+          <a:p>
+            <a:pPr algn="ctr"/>
+            <a:r>
+              <a:rPr lang="en-US" dirty="0"/>
+              <a:t>OUT </a:t>
+            </a:r>
+          </a:p>
+          <a:p>
+            <a:pPr algn="ctr"/>
+            <a:r>
+              <a:rPr lang="en-US" dirty="0"/>
+              <a:t>TRANSACTION</a:t>
+            </a:r>
+          </a:p>
+        </p:txBody>
+      </p:sp>
+      <p:cxnSp>
+        <p:nvCxnSpPr>
+          <p:cNvPr id="44" name="Straight Connector 43">
+            <a:extLst>
+              <a:ext uri="{FF2B5EF4-FFF2-40B4-BE49-F238E27FC236}">
+                <a16:creationId xmlns:a16="http://schemas.microsoft.com/office/drawing/2014/main" id="{FD4C0353-E192-4BE8-A12A-149652FD4FE1}"/>
+              </a:ext>
+            </a:extLst>
+          </p:cNvPr>
+          <p:cNvCxnSpPr>
+            <a:cxnSpLocks/>
+          </p:cNvCxnSpPr>
+          <p:nvPr/>
+        </p:nvCxnSpPr>
+        <p:spPr>
+          <a:xfrm>
+            <a:off x="1005840" y="903060"/>
+            <a:ext cx="5723928" cy="0"/>
+          </a:xfrm>
+          <a:prstGeom prst="line">
+            <a:avLst/>
+          </a:prstGeom>
+        </p:spPr>
+        <p:style>
+          <a:lnRef idx="1">
+            <a:schemeClr val="accent1"/>
+          </a:lnRef>
+          <a:fillRef idx="0">
+            <a:schemeClr val="accent1"/>
+          </a:fillRef>
+          <a:effectRef idx="0">
+            <a:schemeClr val="accent1"/>
+          </a:effectRef>
+          <a:fontRef idx="minor">
+            <a:schemeClr val="tx1"/>
+          </a:fontRef>
+        </p:style>
+      </p:cxnSp>
+      <p:sp>
+        <p:nvSpPr>
+          <p:cNvPr id="46" name="TextBox 45">
+            <a:extLst>
+              <a:ext uri="{FF2B5EF4-FFF2-40B4-BE49-F238E27FC236}">
+                <a16:creationId xmlns:a16="http://schemas.microsoft.com/office/drawing/2014/main" id="{4D42B80A-F497-48B4-9B57-9DA2363DD7B8}"/>
+              </a:ext>
+            </a:extLst>
+          </p:cNvPr>
+          <p:cNvSpPr txBox="1"/>
+          <p:nvPr/>
+        </p:nvSpPr>
+        <p:spPr>
+          <a:xfrm>
+            <a:off x="3100094" y="453628"/>
+            <a:ext cx="2113592" cy="369332"/>
+          </a:xfrm>
+          <a:prstGeom prst="rect">
+            <a:avLst/>
+          </a:prstGeom>
+          <a:noFill/>
+        </p:spPr>
+        <p:txBody>
+          <a:bodyPr wrap="none" rtlCol="0">
+            <a:spAutoFit/>
+          </a:bodyPr>
+          <a:lstStyle/>
+          <a:p>
+            <a:r>
+              <a:rPr lang="en-US" dirty="0"/>
+              <a:t>CONTROL TRANSFER</a:t>
+            </a:r>
+          </a:p>
+        </p:txBody>
+      </p:sp>
     </p:spTree>
     <p:extLst>
       <p:ext uri="{BB962C8B-B14F-4D97-AF65-F5344CB8AC3E}">
@@ -4149,6 +5723,817 @@
           <a:chExt cx="0" cy="0"/>
         </a:xfrm>
       </p:grpSpPr>
+      <p:cxnSp>
+        <p:nvCxnSpPr>
+          <p:cNvPr id="3" name="Straight Arrow Connector 2">
+            <a:extLst>
+              <a:ext uri="{FF2B5EF4-FFF2-40B4-BE49-F238E27FC236}">
+                <a16:creationId xmlns:a16="http://schemas.microsoft.com/office/drawing/2014/main" id="{58CBB00C-2919-486D-9DC2-F0C57BB5228B}"/>
+              </a:ext>
+            </a:extLst>
+          </p:cNvPr>
+          <p:cNvCxnSpPr>
+            <a:cxnSpLocks/>
+          </p:cNvCxnSpPr>
+          <p:nvPr/>
+        </p:nvCxnSpPr>
+        <p:spPr>
+          <a:xfrm>
+            <a:off x="2194560" y="5120640"/>
+            <a:ext cx="5323840" cy="0"/>
+          </a:xfrm>
+          <a:prstGeom prst="straightConnector1">
+            <a:avLst/>
+          </a:prstGeom>
+          <a:ln>
+            <a:tailEnd type="triangle"/>
+          </a:ln>
+        </p:spPr>
+        <p:style>
+          <a:lnRef idx="1">
+            <a:schemeClr val="accent1"/>
+          </a:lnRef>
+          <a:fillRef idx="0">
+            <a:schemeClr val="accent1"/>
+          </a:fillRef>
+          <a:effectRef idx="0">
+            <a:schemeClr val="accent1"/>
+          </a:effectRef>
+          <a:fontRef idx="minor">
+            <a:schemeClr val="tx1"/>
+          </a:fontRef>
+        </p:style>
+      </p:cxnSp>
+      <p:sp>
+        <p:nvSpPr>
+          <p:cNvPr id="10" name="Rectangle 9">
+            <a:extLst>
+              <a:ext uri="{FF2B5EF4-FFF2-40B4-BE49-F238E27FC236}">
+                <a16:creationId xmlns:a16="http://schemas.microsoft.com/office/drawing/2014/main" id="{3DC7C2C3-70DC-49F3-83FD-AE6D275C5770}"/>
+              </a:ext>
+            </a:extLst>
+          </p:cNvPr>
+          <p:cNvSpPr/>
+          <p:nvPr/>
+        </p:nvSpPr>
+        <p:spPr>
+          <a:xfrm>
+            <a:off x="3796068" y="5434874"/>
+            <a:ext cx="381000" cy="502920"/>
+          </a:xfrm>
+          <a:prstGeom prst="rect">
+            <a:avLst/>
+          </a:prstGeom>
+        </p:spPr>
+        <p:style>
+          <a:lnRef idx="2">
+            <a:schemeClr val="accent1">
+              <a:shade val="50000"/>
+            </a:schemeClr>
+          </a:lnRef>
+          <a:fillRef idx="1">
+            <a:schemeClr val="accent1"/>
+          </a:fillRef>
+          <a:effectRef idx="0">
+            <a:schemeClr val="accent1"/>
+          </a:effectRef>
+          <a:fontRef idx="minor">
+            <a:schemeClr val="lt1"/>
+          </a:fontRef>
+        </p:style>
+        <p:txBody>
+          <a:bodyPr rtlCol="0" anchor="ctr"/>
+          <a:lstStyle/>
+          <a:p>
+            <a:pPr algn="ctr"/>
+            <a:endParaRPr lang="en-US" dirty="0"/>
+          </a:p>
+        </p:txBody>
+      </p:sp>
+      <p:sp>
+        <p:nvSpPr>
+          <p:cNvPr id="11" name="Rectangle 10">
+            <a:extLst>
+              <a:ext uri="{FF2B5EF4-FFF2-40B4-BE49-F238E27FC236}">
+                <a16:creationId xmlns:a16="http://schemas.microsoft.com/office/drawing/2014/main" id="{843A1A9A-90ED-4F1D-B23E-B94AA136D820}"/>
+              </a:ext>
+            </a:extLst>
+          </p:cNvPr>
+          <p:cNvSpPr/>
+          <p:nvPr/>
+        </p:nvSpPr>
+        <p:spPr>
+          <a:xfrm>
+            <a:off x="3796068" y="6135914"/>
+            <a:ext cx="381000" cy="502919"/>
+          </a:xfrm>
+          <a:prstGeom prst="rect">
+            <a:avLst/>
+          </a:prstGeom>
+          <a:solidFill>
+            <a:schemeClr val="bg1">
+              <a:lumMod val="95000"/>
+            </a:schemeClr>
+          </a:solidFill>
+        </p:spPr>
+        <p:style>
+          <a:lnRef idx="2">
+            <a:schemeClr val="accent1">
+              <a:shade val="50000"/>
+            </a:schemeClr>
+          </a:lnRef>
+          <a:fillRef idx="1">
+            <a:schemeClr val="accent1"/>
+          </a:fillRef>
+          <a:effectRef idx="0">
+            <a:schemeClr val="accent1"/>
+          </a:effectRef>
+          <a:fontRef idx="minor">
+            <a:schemeClr val="lt1"/>
+          </a:fontRef>
+        </p:style>
+        <p:txBody>
+          <a:bodyPr rtlCol="0" anchor="ctr"/>
+          <a:lstStyle/>
+          <a:p>
+            <a:pPr algn="ctr"/>
+            <a:endParaRPr lang="en-US" dirty="0">
+              <a:solidFill>
+                <a:schemeClr val="tx2"/>
+              </a:solidFill>
+            </a:endParaRPr>
+          </a:p>
+        </p:txBody>
+      </p:sp>
+      <p:sp>
+        <p:nvSpPr>
+          <p:cNvPr id="12" name="TextBox 11">
+            <a:extLst>
+              <a:ext uri="{FF2B5EF4-FFF2-40B4-BE49-F238E27FC236}">
+                <a16:creationId xmlns:a16="http://schemas.microsoft.com/office/drawing/2014/main" id="{FC533C83-22BE-40B4-9CB3-20A137FBD04B}"/>
+              </a:ext>
+            </a:extLst>
+          </p:cNvPr>
+          <p:cNvSpPr txBox="1"/>
+          <p:nvPr/>
+        </p:nvSpPr>
+        <p:spPr>
+          <a:xfrm>
+            <a:off x="4337088" y="5499549"/>
+            <a:ext cx="1811714" cy="369332"/>
+          </a:xfrm>
+          <a:prstGeom prst="rect">
+            <a:avLst/>
+          </a:prstGeom>
+          <a:noFill/>
+        </p:spPr>
+        <p:txBody>
+          <a:bodyPr wrap="none" rtlCol="0">
+            <a:spAutoFit/>
+          </a:bodyPr>
+          <a:lstStyle/>
+          <a:p>
+            <a:r>
+              <a:rPr lang="zh-CN" altLang="en-US" dirty="0"/>
+              <a:t>包，方向：</a:t>
+            </a:r>
+            <a:r>
+              <a:rPr lang="en-US" dirty="0"/>
+              <a:t>H-&gt;D</a:t>
+            </a:r>
+          </a:p>
+        </p:txBody>
+      </p:sp>
+      <p:sp>
+        <p:nvSpPr>
+          <p:cNvPr id="13" name="TextBox 12">
+            <a:extLst>
+              <a:ext uri="{FF2B5EF4-FFF2-40B4-BE49-F238E27FC236}">
+                <a16:creationId xmlns:a16="http://schemas.microsoft.com/office/drawing/2014/main" id="{4776DC2B-3711-4692-BA18-04751C0C4660}"/>
+              </a:ext>
+            </a:extLst>
+          </p:cNvPr>
+          <p:cNvSpPr txBox="1"/>
+          <p:nvPr/>
+        </p:nvSpPr>
+        <p:spPr>
+          <a:xfrm>
+            <a:off x="4337088" y="6181634"/>
+            <a:ext cx="1864613" cy="369332"/>
+          </a:xfrm>
+          <a:prstGeom prst="rect">
+            <a:avLst/>
+          </a:prstGeom>
+          <a:noFill/>
+        </p:spPr>
+        <p:txBody>
+          <a:bodyPr wrap="none" rtlCol="0">
+            <a:spAutoFit/>
+          </a:bodyPr>
+          <a:lstStyle/>
+          <a:p>
+            <a:r>
+              <a:rPr lang="zh-CN" altLang="en-US" dirty="0"/>
+              <a:t>包，方向： </a:t>
+            </a:r>
+            <a:r>
+              <a:rPr lang="en-US" dirty="0"/>
+              <a:t>D-&gt;H</a:t>
+            </a:r>
+          </a:p>
+        </p:txBody>
+      </p:sp>
+      <p:sp>
+        <p:nvSpPr>
+          <p:cNvPr id="21" name="Rectangle 20">
+            <a:extLst>
+              <a:ext uri="{FF2B5EF4-FFF2-40B4-BE49-F238E27FC236}">
+                <a16:creationId xmlns:a16="http://schemas.microsoft.com/office/drawing/2014/main" id="{5B743938-1CDB-4A7C-9F52-7E6F362518F1}"/>
+              </a:ext>
+            </a:extLst>
+          </p:cNvPr>
+          <p:cNvSpPr/>
+          <p:nvPr/>
+        </p:nvSpPr>
+        <p:spPr>
+          <a:xfrm>
+            <a:off x="3406140" y="2727961"/>
+            <a:ext cx="381000" cy="2194560"/>
+          </a:xfrm>
+          <a:prstGeom prst="rect">
+            <a:avLst/>
+          </a:prstGeom>
+        </p:spPr>
+        <p:style>
+          <a:lnRef idx="2">
+            <a:schemeClr val="accent1">
+              <a:shade val="50000"/>
+            </a:schemeClr>
+          </a:lnRef>
+          <a:fillRef idx="1">
+            <a:schemeClr val="accent1"/>
+          </a:fillRef>
+          <a:effectRef idx="0">
+            <a:schemeClr val="accent1"/>
+          </a:effectRef>
+          <a:fontRef idx="minor">
+            <a:schemeClr val="lt1"/>
+          </a:fontRef>
+        </p:style>
+        <p:txBody>
+          <a:bodyPr rtlCol="0" anchor="ctr"/>
+          <a:lstStyle/>
+          <a:p>
+            <a:pPr algn="ctr"/>
+            <a:r>
+              <a:rPr lang="en-US" dirty="0"/>
+              <a:t>IN</a:t>
+            </a:r>
+          </a:p>
+        </p:txBody>
+      </p:sp>
+      <p:sp>
+        <p:nvSpPr>
+          <p:cNvPr id="23" name="Rectangle 22">
+            <a:extLst>
+              <a:ext uri="{FF2B5EF4-FFF2-40B4-BE49-F238E27FC236}">
+                <a16:creationId xmlns:a16="http://schemas.microsoft.com/office/drawing/2014/main" id="{AEEDED11-6E5F-4B8A-873B-DF2C94510BDB}"/>
+              </a:ext>
+            </a:extLst>
+          </p:cNvPr>
+          <p:cNvSpPr/>
+          <p:nvPr/>
+        </p:nvSpPr>
+        <p:spPr>
+          <a:xfrm>
+            <a:off x="3905904" y="2727961"/>
+            <a:ext cx="381000" cy="2194560"/>
+          </a:xfrm>
+          <a:prstGeom prst="rect">
+            <a:avLst/>
+          </a:prstGeom>
+          <a:solidFill>
+            <a:schemeClr val="bg1">
+              <a:lumMod val="95000"/>
+            </a:schemeClr>
+          </a:solidFill>
+        </p:spPr>
+        <p:style>
+          <a:lnRef idx="2">
+            <a:schemeClr val="accent1">
+              <a:shade val="50000"/>
+            </a:schemeClr>
+          </a:lnRef>
+          <a:fillRef idx="1">
+            <a:schemeClr val="accent1"/>
+          </a:fillRef>
+          <a:effectRef idx="0">
+            <a:schemeClr val="accent1"/>
+          </a:effectRef>
+          <a:fontRef idx="minor">
+            <a:schemeClr val="lt1"/>
+          </a:fontRef>
+        </p:style>
+        <p:txBody>
+          <a:bodyPr rtlCol="0" anchor="ctr"/>
+          <a:lstStyle/>
+          <a:p>
+            <a:pPr algn="ctr"/>
+            <a:r>
+              <a:rPr lang="en-US" dirty="0">
+                <a:solidFill>
+                  <a:schemeClr val="tx1"/>
+                </a:solidFill>
+              </a:rPr>
+              <a:t>DATA1</a:t>
+            </a:r>
+          </a:p>
+        </p:txBody>
+      </p:sp>
+      <p:cxnSp>
+        <p:nvCxnSpPr>
+          <p:cNvPr id="24" name="Straight Arrow Connector 23">
+            <a:extLst>
+              <a:ext uri="{FF2B5EF4-FFF2-40B4-BE49-F238E27FC236}">
+                <a16:creationId xmlns:a16="http://schemas.microsoft.com/office/drawing/2014/main" id="{B5B7D70D-E1A3-41E9-88EA-084080F783E3}"/>
+              </a:ext>
+            </a:extLst>
+          </p:cNvPr>
+          <p:cNvCxnSpPr/>
+          <p:nvPr/>
+        </p:nvCxnSpPr>
+        <p:spPr>
+          <a:xfrm>
+            <a:off x="3596640" y="1828800"/>
+            <a:ext cx="0" cy="792480"/>
+          </a:xfrm>
+          <a:prstGeom prst="straightConnector1">
+            <a:avLst/>
+          </a:prstGeom>
+          <a:ln>
+            <a:tailEnd type="triangle"/>
+          </a:ln>
+        </p:spPr>
+        <p:style>
+          <a:lnRef idx="1">
+            <a:schemeClr val="accent1"/>
+          </a:lnRef>
+          <a:fillRef idx="0">
+            <a:schemeClr val="accent1"/>
+          </a:fillRef>
+          <a:effectRef idx="0">
+            <a:schemeClr val="accent1"/>
+          </a:effectRef>
+          <a:fontRef idx="minor">
+            <a:schemeClr val="tx1"/>
+          </a:fontRef>
+        </p:style>
+      </p:cxnSp>
+      <p:cxnSp>
+        <p:nvCxnSpPr>
+          <p:cNvPr id="28" name="Straight Arrow Connector 27">
+            <a:extLst>
+              <a:ext uri="{FF2B5EF4-FFF2-40B4-BE49-F238E27FC236}">
+                <a16:creationId xmlns:a16="http://schemas.microsoft.com/office/drawing/2014/main" id="{369C9D31-AA63-4460-979B-18692E064827}"/>
+              </a:ext>
+            </a:extLst>
+          </p:cNvPr>
+          <p:cNvCxnSpPr>
+            <a:cxnSpLocks/>
+          </p:cNvCxnSpPr>
+          <p:nvPr/>
+        </p:nvCxnSpPr>
+        <p:spPr>
+          <a:xfrm flipV="1">
+            <a:off x="4100868" y="1828800"/>
+            <a:ext cx="0" cy="792480"/>
+          </a:xfrm>
+          <a:prstGeom prst="straightConnector1">
+            <a:avLst/>
+          </a:prstGeom>
+          <a:ln>
+            <a:tailEnd type="triangle"/>
+          </a:ln>
+        </p:spPr>
+        <p:style>
+          <a:lnRef idx="1">
+            <a:schemeClr val="accent1"/>
+          </a:lnRef>
+          <a:fillRef idx="0">
+            <a:schemeClr val="accent1"/>
+          </a:fillRef>
+          <a:effectRef idx="0">
+            <a:schemeClr val="accent1"/>
+          </a:effectRef>
+          <a:fontRef idx="minor">
+            <a:schemeClr val="tx1"/>
+          </a:fontRef>
+        </p:style>
+      </p:cxnSp>
+      <p:sp>
+        <p:nvSpPr>
+          <p:cNvPr id="29" name="Rectangle 28">
+            <a:extLst>
+              <a:ext uri="{FF2B5EF4-FFF2-40B4-BE49-F238E27FC236}">
+                <a16:creationId xmlns:a16="http://schemas.microsoft.com/office/drawing/2014/main" id="{A8EC8419-23FC-491B-81C2-395DE6A15326}"/>
+              </a:ext>
+            </a:extLst>
+          </p:cNvPr>
+          <p:cNvSpPr/>
+          <p:nvPr/>
+        </p:nvSpPr>
+        <p:spPr>
+          <a:xfrm>
+            <a:off x="5577840" y="2727960"/>
+            <a:ext cx="381000" cy="2194560"/>
+          </a:xfrm>
+          <a:prstGeom prst="rect">
+            <a:avLst/>
+          </a:prstGeom>
+        </p:spPr>
+        <p:style>
+          <a:lnRef idx="2">
+            <a:schemeClr val="accent1">
+              <a:shade val="50000"/>
+            </a:schemeClr>
+          </a:lnRef>
+          <a:fillRef idx="1">
+            <a:schemeClr val="accent1"/>
+          </a:fillRef>
+          <a:effectRef idx="0">
+            <a:schemeClr val="accent1"/>
+          </a:effectRef>
+          <a:fontRef idx="minor">
+            <a:schemeClr val="lt1"/>
+          </a:fontRef>
+        </p:style>
+        <p:txBody>
+          <a:bodyPr rtlCol="0" anchor="ctr"/>
+          <a:lstStyle/>
+          <a:p>
+            <a:pPr algn="ctr"/>
+            <a:r>
+              <a:rPr lang="en-US" dirty="0"/>
+              <a:t>OUT</a:t>
+            </a:r>
+          </a:p>
+        </p:txBody>
+      </p:sp>
+      <p:sp>
+        <p:nvSpPr>
+          <p:cNvPr id="31" name="Rectangle 30">
+            <a:extLst>
+              <a:ext uri="{FF2B5EF4-FFF2-40B4-BE49-F238E27FC236}">
+                <a16:creationId xmlns:a16="http://schemas.microsoft.com/office/drawing/2014/main" id="{F534D8E8-4C78-433C-B5DA-21132C0AAAD4}"/>
+              </a:ext>
+            </a:extLst>
+          </p:cNvPr>
+          <p:cNvSpPr/>
+          <p:nvPr/>
+        </p:nvSpPr>
+        <p:spPr>
+          <a:xfrm>
+            <a:off x="6077604" y="2727960"/>
+            <a:ext cx="381000" cy="2194560"/>
+          </a:xfrm>
+          <a:prstGeom prst="rect">
+            <a:avLst/>
+          </a:prstGeom>
+        </p:spPr>
+        <p:style>
+          <a:lnRef idx="2">
+            <a:schemeClr val="accent1">
+              <a:shade val="50000"/>
+            </a:schemeClr>
+          </a:lnRef>
+          <a:fillRef idx="1">
+            <a:schemeClr val="accent1"/>
+          </a:fillRef>
+          <a:effectRef idx="0">
+            <a:schemeClr val="accent1"/>
+          </a:effectRef>
+          <a:fontRef idx="minor">
+            <a:schemeClr val="lt1"/>
+          </a:fontRef>
+        </p:style>
+        <p:txBody>
+          <a:bodyPr rtlCol="0" anchor="ctr"/>
+          <a:lstStyle/>
+          <a:p>
+            <a:pPr algn="ctr"/>
+            <a:r>
+              <a:rPr lang="en-US" dirty="0">
+                <a:solidFill>
+                  <a:schemeClr val="bg1"/>
+                </a:solidFill>
+              </a:rPr>
+              <a:t>DATA1</a:t>
+            </a:r>
+          </a:p>
+        </p:txBody>
+      </p:sp>
+      <p:cxnSp>
+        <p:nvCxnSpPr>
+          <p:cNvPr id="32" name="Straight Arrow Connector 31">
+            <a:extLst>
+              <a:ext uri="{FF2B5EF4-FFF2-40B4-BE49-F238E27FC236}">
+                <a16:creationId xmlns:a16="http://schemas.microsoft.com/office/drawing/2014/main" id="{15EE2B7D-F55A-4AEA-8ECB-386179FCDEB0}"/>
+              </a:ext>
+            </a:extLst>
+          </p:cNvPr>
+          <p:cNvCxnSpPr/>
+          <p:nvPr/>
+        </p:nvCxnSpPr>
+        <p:spPr>
+          <a:xfrm>
+            <a:off x="5768340" y="1828800"/>
+            <a:ext cx="0" cy="792480"/>
+          </a:xfrm>
+          <a:prstGeom prst="straightConnector1">
+            <a:avLst/>
+          </a:prstGeom>
+          <a:ln>
+            <a:tailEnd type="triangle"/>
+          </a:ln>
+        </p:spPr>
+        <p:style>
+          <a:lnRef idx="1">
+            <a:schemeClr val="accent1"/>
+          </a:lnRef>
+          <a:fillRef idx="0">
+            <a:schemeClr val="accent1"/>
+          </a:fillRef>
+          <a:effectRef idx="0">
+            <a:schemeClr val="accent1"/>
+          </a:effectRef>
+          <a:fontRef idx="minor">
+            <a:schemeClr val="tx1"/>
+          </a:fontRef>
+        </p:style>
+      </p:cxnSp>
+      <p:cxnSp>
+        <p:nvCxnSpPr>
+          <p:cNvPr id="33" name="Straight Arrow Connector 32">
+            <a:extLst>
+              <a:ext uri="{FF2B5EF4-FFF2-40B4-BE49-F238E27FC236}">
+                <a16:creationId xmlns:a16="http://schemas.microsoft.com/office/drawing/2014/main" id="{4EB9CD79-467E-4747-A697-AB0225420F93}"/>
+              </a:ext>
+            </a:extLst>
+          </p:cNvPr>
+          <p:cNvCxnSpPr/>
+          <p:nvPr/>
+        </p:nvCxnSpPr>
+        <p:spPr>
+          <a:xfrm>
+            <a:off x="6268104" y="1828800"/>
+            <a:ext cx="0" cy="792480"/>
+          </a:xfrm>
+          <a:prstGeom prst="straightConnector1">
+            <a:avLst/>
+          </a:prstGeom>
+          <a:ln>
+            <a:tailEnd type="triangle"/>
+          </a:ln>
+        </p:spPr>
+        <p:style>
+          <a:lnRef idx="1">
+            <a:schemeClr val="accent1"/>
+          </a:lnRef>
+          <a:fillRef idx="0">
+            <a:schemeClr val="accent1"/>
+          </a:fillRef>
+          <a:effectRef idx="0">
+            <a:schemeClr val="accent1"/>
+          </a:effectRef>
+          <a:fontRef idx="minor">
+            <a:schemeClr val="tx1"/>
+          </a:fontRef>
+        </p:style>
+      </p:cxnSp>
+      <p:sp>
+        <p:nvSpPr>
+          <p:cNvPr id="36" name="TextBox 35">
+            <a:extLst>
+              <a:ext uri="{FF2B5EF4-FFF2-40B4-BE49-F238E27FC236}">
+                <a16:creationId xmlns:a16="http://schemas.microsoft.com/office/drawing/2014/main" id="{BA6A8AEE-5497-43D6-8036-596BD07754C8}"/>
+              </a:ext>
+            </a:extLst>
+          </p:cNvPr>
+          <p:cNvSpPr txBox="1"/>
+          <p:nvPr/>
+        </p:nvSpPr>
+        <p:spPr>
+          <a:xfrm>
+            <a:off x="6872069" y="5134094"/>
+            <a:ext cx="646331" cy="369332"/>
+          </a:xfrm>
+          <a:prstGeom prst="rect">
+            <a:avLst/>
+          </a:prstGeom>
+          <a:noFill/>
+        </p:spPr>
+        <p:txBody>
+          <a:bodyPr wrap="none" rtlCol="0">
+            <a:spAutoFit/>
+          </a:bodyPr>
+          <a:lstStyle/>
+          <a:p>
+            <a:r>
+              <a:rPr lang="zh-CN" altLang="en-US" dirty="0"/>
+              <a:t>时间</a:t>
+            </a:r>
+            <a:endParaRPr lang="en-US" dirty="0"/>
+          </a:p>
+        </p:txBody>
+      </p:sp>
+      <p:cxnSp>
+        <p:nvCxnSpPr>
+          <p:cNvPr id="39" name="Straight Connector 38">
+            <a:extLst>
+              <a:ext uri="{FF2B5EF4-FFF2-40B4-BE49-F238E27FC236}">
+                <a16:creationId xmlns:a16="http://schemas.microsoft.com/office/drawing/2014/main" id="{3D52D6F7-980D-456A-A820-B578C23D37DE}"/>
+              </a:ext>
+            </a:extLst>
+          </p:cNvPr>
+          <p:cNvCxnSpPr/>
+          <p:nvPr/>
+        </p:nvCxnSpPr>
+        <p:spPr>
+          <a:xfrm>
+            <a:off x="3177540" y="1712685"/>
+            <a:ext cx="1380528" cy="0"/>
+          </a:xfrm>
+          <a:prstGeom prst="line">
+            <a:avLst/>
+          </a:prstGeom>
+        </p:spPr>
+        <p:style>
+          <a:lnRef idx="1">
+            <a:schemeClr val="accent1"/>
+          </a:lnRef>
+          <a:fillRef idx="0">
+            <a:schemeClr val="accent1"/>
+          </a:fillRef>
+          <a:effectRef idx="0">
+            <a:schemeClr val="accent1"/>
+          </a:effectRef>
+          <a:fontRef idx="minor">
+            <a:schemeClr val="tx1"/>
+          </a:fontRef>
+        </p:style>
+      </p:cxnSp>
+      <p:cxnSp>
+        <p:nvCxnSpPr>
+          <p:cNvPr id="40" name="Straight Connector 39">
+            <a:extLst>
+              <a:ext uri="{FF2B5EF4-FFF2-40B4-BE49-F238E27FC236}">
+                <a16:creationId xmlns:a16="http://schemas.microsoft.com/office/drawing/2014/main" id="{18466AB4-3B97-4880-A89C-DC9D47E736EC}"/>
+              </a:ext>
+            </a:extLst>
+          </p:cNvPr>
+          <p:cNvCxnSpPr/>
+          <p:nvPr/>
+        </p:nvCxnSpPr>
+        <p:spPr>
+          <a:xfrm>
+            <a:off x="5349240" y="1712685"/>
+            <a:ext cx="1380528" cy="0"/>
+          </a:xfrm>
+          <a:prstGeom prst="line">
+            <a:avLst/>
+          </a:prstGeom>
+        </p:spPr>
+        <p:style>
+          <a:lnRef idx="1">
+            <a:schemeClr val="accent1"/>
+          </a:lnRef>
+          <a:fillRef idx="0">
+            <a:schemeClr val="accent1"/>
+          </a:fillRef>
+          <a:effectRef idx="0">
+            <a:schemeClr val="accent1"/>
+          </a:effectRef>
+          <a:fontRef idx="minor">
+            <a:schemeClr val="tx1"/>
+          </a:fontRef>
+        </p:style>
+      </p:cxnSp>
+      <p:sp>
+        <p:nvSpPr>
+          <p:cNvPr id="42" name="TextBox 41">
+            <a:extLst>
+              <a:ext uri="{FF2B5EF4-FFF2-40B4-BE49-F238E27FC236}">
+                <a16:creationId xmlns:a16="http://schemas.microsoft.com/office/drawing/2014/main" id="{38019928-36F2-4B49-B5F0-5EB2E0B5A8A4}"/>
+              </a:ext>
+            </a:extLst>
+          </p:cNvPr>
+          <p:cNvSpPr txBox="1"/>
+          <p:nvPr/>
+        </p:nvSpPr>
+        <p:spPr>
+          <a:xfrm>
+            <a:off x="3100094" y="1065044"/>
+            <a:ext cx="1535420" cy="646331"/>
+          </a:xfrm>
+          <a:prstGeom prst="rect">
+            <a:avLst/>
+          </a:prstGeom>
+          <a:noFill/>
+        </p:spPr>
+        <p:txBody>
+          <a:bodyPr wrap="none" rtlCol="0">
+            <a:spAutoFit/>
+          </a:bodyPr>
+          <a:lstStyle/>
+          <a:p>
+            <a:pPr algn="ctr"/>
+            <a:r>
+              <a:rPr lang="en-US" dirty="0"/>
+              <a:t>IN </a:t>
+            </a:r>
+          </a:p>
+          <a:p>
+            <a:pPr algn="ctr"/>
+            <a:r>
+              <a:rPr lang="en-US" dirty="0"/>
+              <a:t>TRANSACTION</a:t>
+            </a:r>
+          </a:p>
+        </p:txBody>
+      </p:sp>
+      <p:sp>
+        <p:nvSpPr>
+          <p:cNvPr id="43" name="TextBox 42">
+            <a:extLst>
+              <a:ext uri="{FF2B5EF4-FFF2-40B4-BE49-F238E27FC236}">
+                <a16:creationId xmlns:a16="http://schemas.microsoft.com/office/drawing/2014/main" id="{E065E59A-538D-461E-A188-0E5594C61E60}"/>
+              </a:ext>
+            </a:extLst>
+          </p:cNvPr>
+          <p:cNvSpPr txBox="1"/>
+          <p:nvPr/>
+        </p:nvSpPr>
+        <p:spPr>
+          <a:xfrm>
+            <a:off x="5271794" y="1047217"/>
+            <a:ext cx="1535420" cy="646331"/>
+          </a:xfrm>
+          <a:prstGeom prst="rect">
+            <a:avLst/>
+          </a:prstGeom>
+          <a:noFill/>
+        </p:spPr>
+        <p:txBody>
+          <a:bodyPr wrap="none" rtlCol="0">
+            <a:spAutoFit/>
+          </a:bodyPr>
+          <a:lstStyle/>
+          <a:p>
+            <a:pPr algn="ctr"/>
+            <a:r>
+              <a:rPr lang="en-US" dirty="0"/>
+              <a:t>OUT </a:t>
+            </a:r>
+          </a:p>
+          <a:p>
+            <a:pPr algn="ctr"/>
+            <a:r>
+              <a:rPr lang="en-US" dirty="0"/>
+              <a:t>TRANSACTION</a:t>
+            </a:r>
+          </a:p>
+        </p:txBody>
+      </p:sp>
+    </p:spTree>
+    <p:extLst>
+      <p:ext uri="{BB962C8B-B14F-4D97-AF65-F5344CB8AC3E}">
+        <p14:creationId xmlns:p14="http://schemas.microsoft.com/office/powerpoint/2010/main" val="3122384570"/>
+      </p:ext>
+    </p:extLst>
+  </p:cSld>
+  <p:clrMapOvr>
+    <a:masterClrMapping/>
+  </p:clrMapOvr>
+</p:sld>
+</file>
+
+<file path=ppt/slides/slide4.xml><?xml version="1.0" encoding="utf-8"?>
+<p:sld xmlns:a="http://schemas.openxmlformats.org/drawingml/2006/main" xmlns:r="http://schemas.openxmlformats.org/officeDocument/2006/relationships" xmlns:p="http://schemas.openxmlformats.org/presentationml/2006/main">
+  <p:cSld>
+    <p:spTree>
+      <p:nvGrpSpPr>
+        <p:cNvPr id="1" name=""/>
+        <p:cNvGrpSpPr/>
+        <p:nvPr/>
+      </p:nvGrpSpPr>
+      <p:grpSpPr>
+        <a:xfrm>
+          <a:off x="0" y="0"/>
+          <a:ext cx="0" cy="0"/>
+          <a:chOff x="0" y="0"/>
+          <a:chExt cx="0" cy="0"/>
+        </a:xfrm>
+      </p:grpSpPr>
       <p:sp>
         <p:nvSpPr>
           <p:cNvPr id="2" name="Title 1">
@@ -4170,7 +6555,7 @@
           <a:bodyPr/>
           <a:lstStyle/>
           <a:p>
-            <a:endParaRPr lang="en-US"/>
+            <a:endParaRPr lang="en-US" dirty="0"/>
           </a:p>
         </p:txBody>
       </p:sp>
@@ -4195,7 +6580,7 @@
           <a:bodyPr/>
           <a:lstStyle/>
           <a:p>
-            <a:endParaRPr lang="en-US"/>
+            <a:endParaRPr lang="en-US" dirty="0"/>
           </a:p>
         </p:txBody>
       </p:sp>

</xml_diff>

<commit_message>
update structure and document.
</commit_message>
<xml_diff>
--- a/usb/document/USB stack design.pptx
+++ b/usb/document/USB stack design.pptx
@@ -3347,8 +3347,8 @@
         </p:nvSpPr>
         <p:spPr>
           <a:xfrm>
-            <a:off x="750147" y="4766431"/>
-            <a:ext cx="3337560" cy="783167"/>
+            <a:off x="750147" y="4735951"/>
+            <a:ext cx="5010572" cy="783167"/>
           </a:xfrm>
           <a:prstGeom prst="rect">
             <a:avLst/>
@@ -3384,22 +3384,6 @@
               <a:t>(driver)</a:t>
             </a:r>
           </a:p>
-          <a:p>
-            <a:pPr algn="ctr"/>
-            <a:r>
-              <a:rPr lang="en-US" altLang="zh-CN" dirty="0"/>
-              <a:t>(</a:t>
-            </a:r>
-            <a:r>
-              <a:rPr lang="zh-CN" altLang="en-US" dirty="0"/>
-              <a:t>完成包的收发，基本信息解析</a:t>
-            </a:r>
-            <a:r>
-              <a:rPr lang="en-US" altLang="zh-CN" dirty="0"/>
-              <a:t>)</a:t>
-            </a:r>
-            <a:endParaRPr lang="en-US" dirty="0"/>
-          </a:p>
         </p:txBody>
       </p:sp>
       <p:sp>
@@ -3416,8 +3400,8 @@
         </p:nvSpPr>
         <p:spPr>
           <a:xfrm>
-            <a:off x="750147" y="259924"/>
-            <a:ext cx="3337560" cy="960120"/>
+            <a:off x="750147" y="777240"/>
+            <a:ext cx="5010572" cy="442804"/>
           </a:xfrm>
           <a:prstGeom prst="rect">
             <a:avLst/>
@@ -3446,33 +3430,9 @@
             <a:pPr algn="ctr"/>
             <a:r>
               <a:rPr lang="zh-CN" altLang="en-US" dirty="0"/>
-              <a:t>应用层</a:t>
+              <a:t>用户应用层</a:t>
             </a:r>
             <a:endParaRPr lang="en-US" altLang="zh-CN" dirty="0"/>
-          </a:p>
-          <a:p>
-            <a:pPr algn="ctr"/>
-            <a:r>
-              <a:rPr lang="en-US" altLang="zh-CN" dirty="0"/>
-              <a:t>(</a:t>
-            </a:r>
-            <a:r>
-              <a:rPr lang="zh-CN" altLang="en-US" dirty="0"/>
-              <a:t>使用协议层提供的接口</a:t>
-            </a:r>
-            <a:endParaRPr lang="en-US" altLang="zh-CN" dirty="0"/>
-          </a:p>
-          <a:p>
-            <a:pPr algn="ctr"/>
-            <a:r>
-              <a:rPr lang="zh-CN" altLang="en-US" dirty="0"/>
-              <a:t>完成应用功能</a:t>
-            </a:r>
-            <a:r>
-              <a:rPr lang="en-US" altLang="zh-CN" dirty="0"/>
-              <a:t>)</a:t>
-            </a:r>
-            <a:endParaRPr lang="en-US" dirty="0"/>
           </a:p>
         </p:txBody>
       </p:sp>
@@ -3490,8 +3450,8 @@
         </p:nvGrpSpPr>
         <p:grpSpPr>
           <a:xfrm>
-            <a:off x="750147" y="1464854"/>
-            <a:ext cx="3337560" cy="3070860"/>
+            <a:off x="750146" y="1464854"/>
+            <a:ext cx="5010573" cy="3070860"/>
             <a:chOff x="7315200" y="3329940"/>
             <a:chExt cx="3337560" cy="3070860"/>
           </a:xfrm>
@@ -3597,7 +3557,7 @@
           <p:spPr>
             <a:xfrm>
               <a:off x="7619998" y="4667250"/>
-              <a:ext cx="1148078" cy="762000"/>
+              <a:ext cx="768996" cy="762000"/>
             </a:xfrm>
             <a:prstGeom prst="rect">
               <a:avLst/>
@@ -3681,8 +3641,8 @@
           </p:nvSpPr>
           <p:spPr>
             <a:xfrm>
-              <a:off x="9134684" y="4667250"/>
-              <a:ext cx="1253067" cy="762000"/>
+              <a:off x="8630756" y="4674567"/>
+              <a:ext cx="742928" cy="762000"/>
             </a:xfrm>
             <a:prstGeom prst="rect">
               <a:avLst/>
@@ -3901,6 +3861,78 @@
             </a:p>
           </p:txBody>
         </p:sp>
+        <p:sp>
+          <p:nvSpPr>
+            <p:cNvPr id="20" name="Rectangle 19">
+              <a:extLst>
+                <a:ext uri="{FF2B5EF4-FFF2-40B4-BE49-F238E27FC236}">
+                  <a16:creationId xmlns:a16="http://schemas.microsoft.com/office/drawing/2014/main" id="{8C750BEE-10DB-4F02-A5D7-C77A2DB9540D}"/>
+                </a:ext>
+              </a:extLst>
+            </p:cNvPr>
+            <p:cNvSpPr/>
+            <p:nvPr/>
+          </p:nvSpPr>
+          <p:spPr>
+            <a:xfrm>
+              <a:off x="9644824" y="4666343"/>
+              <a:ext cx="742928" cy="762000"/>
+            </a:xfrm>
+            <a:prstGeom prst="rect">
+              <a:avLst/>
+            </a:prstGeom>
+            <a:solidFill>
+              <a:schemeClr val="bg1"/>
+            </a:solidFill>
+          </p:spPr>
+          <p:style>
+            <a:lnRef idx="2">
+              <a:schemeClr val="accent1">
+                <a:shade val="50000"/>
+              </a:schemeClr>
+            </a:lnRef>
+            <a:fillRef idx="1">
+              <a:schemeClr val="accent1"/>
+            </a:fillRef>
+            <a:effectRef idx="0">
+              <a:schemeClr val="accent1"/>
+            </a:effectRef>
+            <a:fontRef idx="minor">
+              <a:schemeClr val="lt1"/>
+            </a:fontRef>
+          </p:style>
+          <p:txBody>
+            <a:bodyPr rtlCol="0" anchor="ctr"/>
+            <a:lstStyle/>
+            <a:p>
+              <a:pPr algn="ctr"/>
+              <a:r>
+                <a:rPr lang="en-US" altLang="zh-CN" sz="1600" dirty="0">
+                  <a:solidFill>
+                    <a:schemeClr val="tx1"/>
+                  </a:solidFill>
+                </a:rPr>
+                <a:t>Debug</a:t>
+              </a:r>
+            </a:p>
+            <a:p>
+              <a:pPr algn="ctr"/>
+              <a:r>
+                <a:rPr lang="zh-CN" altLang="en-US" sz="1600" dirty="0">
+                  <a:solidFill>
+                    <a:schemeClr val="tx1"/>
+                  </a:solidFill>
+                </a:rPr>
+                <a:t>调试组件</a:t>
+              </a:r>
+              <a:endParaRPr lang="en-US" sz="1600" dirty="0">
+                <a:solidFill>
+                  <a:schemeClr val="tx1"/>
+                </a:solidFill>
+              </a:endParaRPr>
+            </a:p>
+          </p:txBody>
+        </p:sp>
       </p:grpSp>
       <p:sp>
         <p:nvSpPr>
@@ -4088,7 +4120,7 @@
         </p:nvSpPr>
         <p:spPr>
           <a:xfrm>
-            <a:off x="750147" y="5826035"/>
+            <a:off x="750147" y="5765075"/>
             <a:ext cx="819573" cy="783167"/>
           </a:xfrm>
           <a:prstGeom prst="rect">
@@ -4149,7 +4181,7 @@
         </p:nvSpPr>
         <p:spPr>
           <a:xfrm>
-            <a:off x="1993900" y="5826034"/>
+            <a:off x="2088163" y="5765074"/>
             <a:ext cx="819573" cy="783167"/>
           </a:xfrm>
           <a:prstGeom prst="rect">
@@ -4210,7 +4242,7 @@
         </p:nvSpPr>
         <p:spPr>
           <a:xfrm>
-            <a:off x="3207174" y="5826033"/>
+            <a:off x="4891195" y="5765073"/>
             <a:ext cx="869524" cy="783167"/>
           </a:xfrm>
           <a:prstGeom prst="rect">
@@ -4252,6 +4284,67 @@
             <a:r>
               <a:rPr lang="en-US" altLang="zh-CN" sz="1400" dirty="0"/>
               <a:t>N</a:t>
+            </a:r>
+            <a:endParaRPr lang="en-US" sz="1400" dirty="0"/>
+          </a:p>
+        </p:txBody>
+      </p:sp>
+      <p:sp>
+        <p:nvSpPr>
+          <p:cNvPr id="21" name="Rectangle 20">
+            <a:extLst>
+              <a:ext uri="{FF2B5EF4-FFF2-40B4-BE49-F238E27FC236}">
+                <a16:creationId xmlns:a16="http://schemas.microsoft.com/office/drawing/2014/main" id="{A22A2A90-D9A3-4685-A2B3-D8346A59A8F0}"/>
+              </a:ext>
+            </a:extLst>
+          </p:cNvPr>
+          <p:cNvSpPr/>
+          <p:nvPr/>
+        </p:nvSpPr>
+        <p:spPr>
+          <a:xfrm>
+            <a:off x="3426179" y="5765073"/>
+            <a:ext cx="946573" cy="783167"/>
+          </a:xfrm>
+          <a:prstGeom prst="rect">
+            <a:avLst/>
+          </a:prstGeom>
+        </p:spPr>
+        <p:style>
+          <a:lnRef idx="2">
+            <a:schemeClr val="accent1">
+              <a:shade val="50000"/>
+            </a:schemeClr>
+          </a:lnRef>
+          <a:fillRef idx="1">
+            <a:schemeClr val="accent1"/>
+          </a:fillRef>
+          <a:effectRef idx="0">
+            <a:schemeClr val="accent1"/>
+          </a:effectRef>
+          <a:fontRef idx="minor">
+            <a:schemeClr val="lt1"/>
+          </a:fontRef>
+        </p:style>
+        <p:txBody>
+          <a:bodyPr rtlCol="0" anchor="ctr"/>
+          <a:lstStyle/>
+          <a:p>
+            <a:pPr algn="ctr"/>
+            <a:r>
+              <a:rPr lang="en-US" altLang="zh-CN" sz="1400" dirty="0"/>
+              <a:t>USB</a:t>
+            </a:r>
+          </a:p>
+          <a:p>
+            <a:pPr algn="ctr"/>
+            <a:r>
+              <a:rPr lang="zh-CN" altLang="en-US" sz="1400" dirty="0"/>
+              <a:t>控制器</a:t>
+            </a:r>
+            <a:r>
+              <a:rPr lang="en-US" altLang="zh-CN" sz="1400" dirty="0"/>
+              <a:t>…</a:t>
             </a:r>
             <a:endParaRPr lang="en-US" sz="1400" dirty="0"/>
           </a:p>

</xml_diff>